<commit_message>
Tue Dec 11 13:12:43 MST 2018
</commit_message>
<xml_diff>
--- a/final.pptx
+++ b/final.pptx
@@ -103,10 +103,8 @@
         <p:txBody>
           <a:bodyPr lIns="0" rIns="0" tIns="0" bIns="0" anchor="ctr"/>
           <a:p>
-            <a:endParaRPr b="0" lang="en-US" sz="1400" spc="-1" strike="noStrike">
-              <a:solidFill>
-                <a:srgbClr val="000000"/>
-              </a:solidFill>
+            <a:pPr algn="ctr"/>
+            <a:endParaRPr b="0" lang="en-US" sz="4400" spc="-1" strike="noStrike">
               <a:latin typeface="Arial"/>
             </a:endParaRPr>
           </a:p>
@@ -136,10 +134,7 @@
             <a:normAutofit/>
           </a:bodyPr>
           <a:p>
-            <a:endParaRPr b="0" lang="en-US" sz="1400" spc="-1" strike="noStrike">
-              <a:solidFill>
-                <a:srgbClr val="000000"/>
-              </a:solidFill>
+            <a:endParaRPr b="0" lang="en-US" sz="3200" spc="-1" strike="noStrike">
               <a:latin typeface="Arial"/>
             </a:endParaRPr>
           </a:p>
@@ -169,10 +164,7 @@
             <a:normAutofit/>
           </a:bodyPr>
           <a:p>
-            <a:endParaRPr b="0" lang="en-US" sz="1400" spc="-1" strike="noStrike">
-              <a:solidFill>
-                <a:srgbClr val="000000"/>
-              </a:solidFill>
+            <a:endParaRPr b="0" lang="en-US" sz="3200" spc="-1" strike="noStrike">
               <a:latin typeface="Arial"/>
             </a:endParaRPr>
           </a:p>
@@ -222,10 +214,8 @@
         <p:txBody>
           <a:bodyPr lIns="0" rIns="0" tIns="0" bIns="0" anchor="ctr"/>
           <a:p>
-            <a:endParaRPr b="0" lang="en-US" sz="1400" spc="-1" strike="noStrike">
-              <a:solidFill>
-                <a:srgbClr val="000000"/>
-              </a:solidFill>
+            <a:pPr algn="ctr"/>
+            <a:endParaRPr b="0" lang="en-US" sz="4400" spc="-1" strike="noStrike">
               <a:latin typeface="Arial"/>
             </a:endParaRPr>
           </a:p>
@@ -255,10 +245,7 @@
             <a:normAutofit/>
           </a:bodyPr>
           <a:p>
-            <a:endParaRPr b="0" lang="en-US" sz="1400" spc="-1" strike="noStrike">
-              <a:solidFill>
-                <a:srgbClr val="000000"/>
-              </a:solidFill>
+            <a:endParaRPr b="0" lang="en-US" sz="3200" spc="-1" strike="noStrike">
               <a:latin typeface="Arial"/>
             </a:endParaRPr>
           </a:p>
@@ -288,10 +275,7 @@
             <a:normAutofit/>
           </a:bodyPr>
           <a:p>
-            <a:endParaRPr b="0" lang="en-US" sz="1400" spc="-1" strike="noStrike">
-              <a:solidFill>
-                <a:srgbClr val="000000"/>
-              </a:solidFill>
+            <a:endParaRPr b="0" lang="en-US" sz="3200" spc="-1" strike="noStrike">
               <a:latin typeface="Arial"/>
             </a:endParaRPr>
           </a:p>
@@ -321,10 +305,7 @@
             <a:normAutofit/>
           </a:bodyPr>
           <a:p>
-            <a:endParaRPr b="0" lang="en-US" sz="1400" spc="-1" strike="noStrike">
-              <a:solidFill>
-                <a:srgbClr val="000000"/>
-              </a:solidFill>
+            <a:endParaRPr b="0" lang="en-US" sz="3200" spc="-1" strike="noStrike">
               <a:latin typeface="Arial"/>
             </a:endParaRPr>
           </a:p>
@@ -354,10 +335,7 @@
             <a:normAutofit/>
           </a:bodyPr>
           <a:p>
-            <a:endParaRPr b="0" lang="en-US" sz="1400" spc="-1" strike="noStrike">
-              <a:solidFill>
-                <a:srgbClr val="000000"/>
-              </a:solidFill>
+            <a:endParaRPr b="0" lang="en-US" sz="3200" spc="-1" strike="noStrike">
               <a:latin typeface="Arial"/>
             </a:endParaRPr>
           </a:p>
@@ -407,10 +385,8 @@
         <p:txBody>
           <a:bodyPr lIns="0" rIns="0" tIns="0" bIns="0" anchor="ctr"/>
           <a:p>
-            <a:endParaRPr b="0" lang="en-US" sz="1400" spc="-1" strike="noStrike">
-              <a:solidFill>
-                <a:srgbClr val="000000"/>
-              </a:solidFill>
+            <a:pPr algn="ctr"/>
+            <a:endParaRPr b="0" lang="en-US" sz="4400" spc="-1" strike="noStrike">
               <a:latin typeface="Arial"/>
             </a:endParaRPr>
           </a:p>
@@ -440,10 +416,7 @@
             <a:normAutofit/>
           </a:bodyPr>
           <a:p>
-            <a:endParaRPr b="0" lang="en-US" sz="1400" spc="-1" strike="noStrike">
-              <a:solidFill>
-                <a:srgbClr val="000000"/>
-              </a:solidFill>
+            <a:endParaRPr b="0" lang="en-US" sz="3200" spc="-1" strike="noStrike">
               <a:latin typeface="Arial"/>
             </a:endParaRPr>
           </a:p>
@@ -473,10 +446,7 @@
             <a:normAutofit/>
           </a:bodyPr>
           <a:p>
-            <a:endParaRPr b="0" lang="en-US" sz="1400" spc="-1" strike="noStrike">
-              <a:solidFill>
-                <a:srgbClr val="000000"/>
-              </a:solidFill>
+            <a:endParaRPr b="0" lang="en-US" sz="3200" spc="-1" strike="noStrike">
               <a:latin typeface="Arial"/>
             </a:endParaRPr>
           </a:p>
@@ -506,10 +476,7 @@
             <a:normAutofit/>
           </a:bodyPr>
           <a:p>
-            <a:endParaRPr b="0" lang="en-US" sz="1400" spc="-1" strike="noStrike">
-              <a:solidFill>
-                <a:srgbClr val="000000"/>
-              </a:solidFill>
+            <a:endParaRPr b="0" lang="en-US" sz="3200" spc="-1" strike="noStrike">
               <a:latin typeface="Arial"/>
             </a:endParaRPr>
           </a:p>
@@ -539,10 +506,7 @@
             <a:normAutofit/>
           </a:bodyPr>
           <a:p>
-            <a:endParaRPr b="0" lang="en-US" sz="1400" spc="-1" strike="noStrike">
-              <a:solidFill>
-                <a:srgbClr val="000000"/>
-              </a:solidFill>
+            <a:endParaRPr b="0" lang="en-US" sz="3200" spc="-1" strike="noStrike">
               <a:latin typeface="Arial"/>
             </a:endParaRPr>
           </a:p>
@@ -572,10 +536,7 @@
             <a:normAutofit/>
           </a:bodyPr>
           <a:p>
-            <a:endParaRPr b="0" lang="en-US" sz="1400" spc="-1" strike="noStrike">
-              <a:solidFill>
-                <a:srgbClr val="000000"/>
-              </a:solidFill>
+            <a:endParaRPr b="0" lang="en-US" sz="3200" spc="-1" strike="noStrike">
               <a:latin typeface="Arial"/>
             </a:endParaRPr>
           </a:p>
@@ -605,10 +566,7 @@
             <a:normAutofit/>
           </a:bodyPr>
           <a:p>
-            <a:endParaRPr b="0" lang="en-US" sz="1400" spc="-1" strike="noStrike">
-              <a:solidFill>
-                <a:srgbClr val="000000"/>
-              </a:solidFill>
+            <a:endParaRPr b="0" lang="en-US" sz="3200" spc="-1" strike="noStrike">
               <a:latin typeface="Arial"/>
             </a:endParaRPr>
           </a:p>
@@ -680,10 +638,8 @@
         <p:txBody>
           <a:bodyPr lIns="0" rIns="0" tIns="0" bIns="0" anchor="ctr"/>
           <a:p>
-            <a:endParaRPr b="0" lang="en-US" sz="1400" spc="-1" strike="noStrike">
-              <a:solidFill>
-                <a:srgbClr val="000000"/>
-              </a:solidFill>
+            <a:pPr algn="ctr"/>
+            <a:endParaRPr b="0" lang="en-US" sz="4400" spc="-1" strike="noStrike">
               <a:latin typeface="Arial"/>
             </a:endParaRPr>
           </a:p>
@@ -762,10 +718,8 @@
         <p:txBody>
           <a:bodyPr lIns="0" rIns="0" tIns="0" bIns="0" anchor="ctr"/>
           <a:p>
-            <a:endParaRPr b="0" lang="en-US" sz="1400" spc="-1" strike="noStrike">
-              <a:solidFill>
-                <a:srgbClr val="000000"/>
-              </a:solidFill>
+            <a:pPr algn="ctr"/>
+            <a:endParaRPr b="0" lang="en-US" sz="4400" spc="-1" strike="noStrike">
               <a:latin typeface="Arial"/>
             </a:endParaRPr>
           </a:p>
@@ -795,10 +749,7 @@
             <a:normAutofit/>
           </a:bodyPr>
           <a:p>
-            <a:endParaRPr b="0" lang="en-US" sz="1400" spc="-1" strike="noStrike">
-              <a:solidFill>
-                <a:srgbClr val="000000"/>
-              </a:solidFill>
+            <a:endParaRPr b="0" lang="en-US" sz="3200" spc="-1" strike="noStrike">
               <a:latin typeface="Arial"/>
             </a:endParaRPr>
           </a:p>
@@ -848,10 +799,8 @@
         <p:txBody>
           <a:bodyPr lIns="0" rIns="0" tIns="0" bIns="0" anchor="ctr"/>
           <a:p>
-            <a:endParaRPr b="0" lang="en-US" sz="1400" spc="-1" strike="noStrike">
-              <a:solidFill>
-                <a:srgbClr val="000000"/>
-              </a:solidFill>
+            <a:pPr algn="ctr"/>
+            <a:endParaRPr b="0" lang="en-US" sz="4400" spc="-1" strike="noStrike">
               <a:latin typeface="Arial"/>
             </a:endParaRPr>
           </a:p>
@@ -881,10 +830,7 @@
             <a:normAutofit/>
           </a:bodyPr>
           <a:p>
-            <a:endParaRPr b="0" lang="en-US" sz="1400" spc="-1" strike="noStrike">
-              <a:solidFill>
-                <a:srgbClr val="000000"/>
-              </a:solidFill>
+            <a:endParaRPr b="0" lang="en-US" sz="3200" spc="-1" strike="noStrike">
               <a:latin typeface="Arial"/>
             </a:endParaRPr>
           </a:p>
@@ -914,10 +860,7 @@
             <a:normAutofit/>
           </a:bodyPr>
           <a:p>
-            <a:endParaRPr b="0" lang="en-US" sz="1400" spc="-1" strike="noStrike">
-              <a:solidFill>
-                <a:srgbClr val="000000"/>
-              </a:solidFill>
+            <a:endParaRPr b="0" lang="en-US" sz="3200" spc="-1" strike="noStrike">
               <a:latin typeface="Arial"/>
             </a:endParaRPr>
           </a:p>
@@ -967,10 +910,8 @@
         <p:txBody>
           <a:bodyPr lIns="0" rIns="0" tIns="0" bIns="0" anchor="ctr"/>
           <a:p>
-            <a:endParaRPr b="0" lang="en-US" sz="1400" spc="-1" strike="noStrike">
-              <a:solidFill>
-                <a:srgbClr val="000000"/>
-              </a:solidFill>
+            <a:pPr algn="ctr"/>
+            <a:endParaRPr b="0" lang="en-US" sz="4400" spc="-1" strike="noStrike">
               <a:latin typeface="Arial"/>
             </a:endParaRPr>
           </a:p>
@@ -1071,10 +1012,8 @@
         <p:txBody>
           <a:bodyPr lIns="0" rIns="0" tIns="0" bIns="0" anchor="ctr"/>
           <a:p>
-            <a:endParaRPr b="0" lang="en-US" sz="1400" spc="-1" strike="noStrike">
-              <a:solidFill>
-                <a:srgbClr val="000000"/>
-              </a:solidFill>
+            <a:pPr algn="ctr"/>
+            <a:endParaRPr b="0" lang="en-US" sz="4400" spc="-1" strike="noStrike">
               <a:latin typeface="Arial"/>
             </a:endParaRPr>
           </a:p>
@@ -1104,10 +1043,7 @@
             <a:normAutofit/>
           </a:bodyPr>
           <a:p>
-            <a:endParaRPr b="0" lang="en-US" sz="1400" spc="-1" strike="noStrike">
-              <a:solidFill>
-                <a:srgbClr val="000000"/>
-              </a:solidFill>
+            <a:endParaRPr b="0" lang="en-US" sz="3200" spc="-1" strike="noStrike">
               <a:latin typeface="Arial"/>
             </a:endParaRPr>
           </a:p>
@@ -1137,10 +1073,7 @@
             <a:normAutofit/>
           </a:bodyPr>
           <a:p>
-            <a:endParaRPr b="0" lang="en-US" sz="1400" spc="-1" strike="noStrike">
-              <a:solidFill>
-                <a:srgbClr val="000000"/>
-              </a:solidFill>
+            <a:endParaRPr b="0" lang="en-US" sz="3200" spc="-1" strike="noStrike">
               <a:latin typeface="Arial"/>
             </a:endParaRPr>
           </a:p>
@@ -1170,10 +1103,7 @@
             <a:normAutofit/>
           </a:bodyPr>
           <a:p>
-            <a:endParaRPr b="0" lang="en-US" sz="1400" spc="-1" strike="noStrike">
-              <a:solidFill>
-                <a:srgbClr val="000000"/>
-              </a:solidFill>
+            <a:endParaRPr b="0" lang="en-US" sz="3200" spc="-1" strike="noStrike">
               <a:latin typeface="Arial"/>
             </a:endParaRPr>
           </a:p>
@@ -1223,10 +1153,8 @@
         <p:txBody>
           <a:bodyPr lIns="0" rIns="0" tIns="0" bIns="0" anchor="ctr"/>
           <a:p>
-            <a:endParaRPr b="0" lang="en-US" sz="1400" spc="-1" strike="noStrike">
-              <a:solidFill>
-                <a:srgbClr val="000000"/>
-              </a:solidFill>
+            <a:pPr algn="ctr"/>
+            <a:endParaRPr b="0" lang="en-US" sz="4400" spc="-1" strike="noStrike">
               <a:latin typeface="Arial"/>
             </a:endParaRPr>
           </a:p>
@@ -1305,10 +1233,8 @@
         <p:txBody>
           <a:bodyPr lIns="0" rIns="0" tIns="0" bIns="0" anchor="ctr"/>
           <a:p>
-            <a:endParaRPr b="0" lang="en-US" sz="1400" spc="-1" strike="noStrike">
-              <a:solidFill>
-                <a:srgbClr val="000000"/>
-              </a:solidFill>
+            <a:pPr algn="ctr"/>
+            <a:endParaRPr b="0" lang="en-US" sz="4400" spc="-1" strike="noStrike">
               <a:latin typeface="Arial"/>
             </a:endParaRPr>
           </a:p>
@@ -1338,10 +1264,7 @@
             <a:normAutofit/>
           </a:bodyPr>
           <a:p>
-            <a:endParaRPr b="0" lang="en-US" sz="1400" spc="-1" strike="noStrike">
-              <a:solidFill>
-                <a:srgbClr val="000000"/>
-              </a:solidFill>
+            <a:endParaRPr b="0" lang="en-US" sz="3200" spc="-1" strike="noStrike">
               <a:latin typeface="Arial"/>
             </a:endParaRPr>
           </a:p>
@@ -1371,10 +1294,7 @@
             <a:normAutofit/>
           </a:bodyPr>
           <a:p>
-            <a:endParaRPr b="0" lang="en-US" sz="1400" spc="-1" strike="noStrike">
-              <a:solidFill>
-                <a:srgbClr val="000000"/>
-              </a:solidFill>
+            <a:endParaRPr b="0" lang="en-US" sz="3200" spc="-1" strike="noStrike">
               <a:latin typeface="Arial"/>
             </a:endParaRPr>
           </a:p>
@@ -1404,10 +1324,7 @@
             <a:normAutofit/>
           </a:bodyPr>
           <a:p>
-            <a:endParaRPr b="0" lang="en-US" sz="1400" spc="-1" strike="noStrike">
-              <a:solidFill>
-                <a:srgbClr val="000000"/>
-              </a:solidFill>
+            <a:endParaRPr b="0" lang="en-US" sz="3200" spc="-1" strike="noStrike">
               <a:latin typeface="Arial"/>
             </a:endParaRPr>
           </a:p>
@@ -1457,10 +1374,8 @@
         <p:txBody>
           <a:bodyPr lIns="0" rIns="0" tIns="0" bIns="0" anchor="ctr"/>
           <a:p>
-            <a:endParaRPr b="0" lang="en-US" sz="1400" spc="-1" strike="noStrike">
-              <a:solidFill>
-                <a:srgbClr val="000000"/>
-              </a:solidFill>
+            <a:pPr algn="ctr"/>
+            <a:endParaRPr b="0" lang="en-US" sz="4400" spc="-1" strike="noStrike">
               <a:latin typeface="Arial"/>
             </a:endParaRPr>
           </a:p>
@@ -1490,10 +1405,7 @@
             <a:normAutofit/>
           </a:bodyPr>
           <a:p>
-            <a:endParaRPr b="0" lang="en-US" sz="1400" spc="-1" strike="noStrike">
-              <a:solidFill>
-                <a:srgbClr val="000000"/>
-              </a:solidFill>
+            <a:endParaRPr b="0" lang="en-US" sz="3200" spc="-1" strike="noStrike">
               <a:latin typeface="Arial"/>
             </a:endParaRPr>
           </a:p>
@@ -1523,10 +1435,7 @@
             <a:normAutofit/>
           </a:bodyPr>
           <a:p>
-            <a:endParaRPr b="0" lang="en-US" sz="1400" spc="-1" strike="noStrike">
-              <a:solidFill>
-                <a:srgbClr val="000000"/>
-              </a:solidFill>
+            <a:endParaRPr b="0" lang="en-US" sz="3200" spc="-1" strike="noStrike">
               <a:latin typeface="Arial"/>
             </a:endParaRPr>
           </a:p>
@@ -1556,10 +1465,7 @@
             <a:normAutofit/>
           </a:bodyPr>
           <a:p>
-            <a:endParaRPr b="0" lang="en-US" sz="1400" spc="-1" strike="noStrike">
-              <a:solidFill>
-                <a:srgbClr val="000000"/>
-              </a:solidFill>
+            <a:endParaRPr b="0" lang="en-US" sz="3200" spc="-1" strike="noStrike">
               <a:latin typeface="Arial"/>
             </a:endParaRPr>
           </a:p>
@@ -1609,10 +1515,8 @@
         <p:txBody>
           <a:bodyPr lIns="0" rIns="0" tIns="0" bIns="0" anchor="ctr"/>
           <a:p>
-            <a:endParaRPr b="0" lang="en-US" sz="1400" spc="-1" strike="noStrike">
-              <a:solidFill>
-                <a:srgbClr val="000000"/>
-              </a:solidFill>
+            <a:pPr algn="ctr"/>
+            <a:endParaRPr b="0" lang="en-US" sz="4400" spc="-1" strike="noStrike">
               <a:latin typeface="Arial"/>
             </a:endParaRPr>
           </a:p>
@@ -1642,10 +1546,7 @@
             <a:normAutofit/>
           </a:bodyPr>
           <a:p>
-            <a:endParaRPr b="0" lang="en-US" sz="1400" spc="-1" strike="noStrike">
-              <a:solidFill>
-                <a:srgbClr val="000000"/>
-              </a:solidFill>
+            <a:endParaRPr b="0" lang="en-US" sz="3200" spc="-1" strike="noStrike">
               <a:latin typeface="Arial"/>
             </a:endParaRPr>
           </a:p>
@@ -1675,10 +1576,7 @@
             <a:normAutofit/>
           </a:bodyPr>
           <a:p>
-            <a:endParaRPr b="0" lang="en-US" sz="1400" spc="-1" strike="noStrike">
-              <a:solidFill>
-                <a:srgbClr val="000000"/>
-              </a:solidFill>
+            <a:endParaRPr b="0" lang="en-US" sz="3200" spc="-1" strike="noStrike">
               <a:latin typeface="Arial"/>
             </a:endParaRPr>
           </a:p>
@@ -1728,10 +1626,8 @@
         <p:txBody>
           <a:bodyPr lIns="0" rIns="0" tIns="0" bIns="0" anchor="ctr"/>
           <a:p>
-            <a:endParaRPr b="0" lang="en-US" sz="1400" spc="-1" strike="noStrike">
-              <a:solidFill>
-                <a:srgbClr val="000000"/>
-              </a:solidFill>
+            <a:pPr algn="ctr"/>
+            <a:endParaRPr b="0" lang="en-US" sz="4400" spc="-1" strike="noStrike">
               <a:latin typeface="Arial"/>
             </a:endParaRPr>
           </a:p>
@@ -1761,10 +1657,7 @@
             <a:normAutofit/>
           </a:bodyPr>
           <a:p>
-            <a:endParaRPr b="0" lang="en-US" sz="1400" spc="-1" strike="noStrike">
-              <a:solidFill>
-                <a:srgbClr val="000000"/>
-              </a:solidFill>
+            <a:endParaRPr b="0" lang="en-US" sz="3200" spc="-1" strike="noStrike">
               <a:latin typeface="Arial"/>
             </a:endParaRPr>
           </a:p>
@@ -1794,10 +1687,7 @@
             <a:normAutofit/>
           </a:bodyPr>
           <a:p>
-            <a:endParaRPr b="0" lang="en-US" sz="1400" spc="-1" strike="noStrike">
-              <a:solidFill>
-                <a:srgbClr val="000000"/>
-              </a:solidFill>
+            <a:endParaRPr b="0" lang="en-US" sz="3200" spc="-1" strike="noStrike">
               <a:latin typeface="Arial"/>
             </a:endParaRPr>
           </a:p>
@@ -1827,10 +1717,7 @@
             <a:normAutofit/>
           </a:bodyPr>
           <a:p>
-            <a:endParaRPr b="0" lang="en-US" sz="1400" spc="-1" strike="noStrike">
-              <a:solidFill>
-                <a:srgbClr val="000000"/>
-              </a:solidFill>
+            <a:endParaRPr b="0" lang="en-US" sz="3200" spc="-1" strike="noStrike">
               <a:latin typeface="Arial"/>
             </a:endParaRPr>
           </a:p>
@@ -1860,10 +1747,7 @@
             <a:normAutofit/>
           </a:bodyPr>
           <a:p>
-            <a:endParaRPr b="0" lang="en-US" sz="1400" spc="-1" strike="noStrike">
-              <a:solidFill>
-                <a:srgbClr val="000000"/>
-              </a:solidFill>
+            <a:endParaRPr b="0" lang="en-US" sz="3200" spc="-1" strike="noStrike">
               <a:latin typeface="Arial"/>
             </a:endParaRPr>
           </a:p>
@@ -1913,10 +1797,8 @@
         <p:txBody>
           <a:bodyPr lIns="0" rIns="0" tIns="0" bIns="0" anchor="ctr"/>
           <a:p>
-            <a:endParaRPr b="0" lang="en-US" sz="1400" spc="-1" strike="noStrike">
-              <a:solidFill>
-                <a:srgbClr val="000000"/>
-              </a:solidFill>
+            <a:pPr algn="ctr"/>
+            <a:endParaRPr b="0" lang="en-US" sz="4400" spc="-1" strike="noStrike">
               <a:latin typeface="Arial"/>
             </a:endParaRPr>
           </a:p>
@@ -1946,10 +1828,7 @@
             <a:normAutofit/>
           </a:bodyPr>
           <a:p>
-            <a:endParaRPr b="0" lang="en-US" sz="1400" spc="-1" strike="noStrike">
-              <a:solidFill>
-                <a:srgbClr val="000000"/>
-              </a:solidFill>
+            <a:endParaRPr b="0" lang="en-US" sz="3200" spc="-1" strike="noStrike">
               <a:latin typeface="Arial"/>
             </a:endParaRPr>
           </a:p>
@@ -1979,10 +1858,7 @@
             <a:normAutofit/>
           </a:bodyPr>
           <a:p>
-            <a:endParaRPr b="0" lang="en-US" sz="1400" spc="-1" strike="noStrike">
-              <a:solidFill>
-                <a:srgbClr val="000000"/>
-              </a:solidFill>
+            <a:endParaRPr b="0" lang="en-US" sz="3200" spc="-1" strike="noStrike">
               <a:latin typeface="Arial"/>
             </a:endParaRPr>
           </a:p>
@@ -2012,10 +1888,7 @@
             <a:normAutofit/>
           </a:bodyPr>
           <a:p>
-            <a:endParaRPr b="0" lang="en-US" sz="1400" spc="-1" strike="noStrike">
-              <a:solidFill>
-                <a:srgbClr val="000000"/>
-              </a:solidFill>
+            <a:endParaRPr b="0" lang="en-US" sz="3200" spc="-1" strike="noStrike">
               <a:latin typeface="Arial"/>
             </a:endParaRPr>
           </a:p>
@@ -2045,10 +1918,7 @@
             <a:normAutofit/>
           </a:bodyPr>
           <a:p>
-            <a:endParaRPr b="0" lang="en-US" sz="1400" spc="-1" strike="noStrike">
-              <a:solidFill>
-                <a:srgbClr val="000000"/>
-              </a:solidFill>
+            <a:endParaRPr b="0" lang="en-US" sz="3200" spc="-1" strike="noStrike">
               <a:latin typeface="Arial"/>
             </a:endParaRPr>
           </a:p>
@@ -2078,10 +1948,7 @@
             <a:normAutofit/>
           </a:bodyPr>
           <a:p>
-            <a:endParaRPr b="0" lang="en-US" sz="1400" spc="-1" strike="noStrike">
-              <a:solidFill>
-                <a:srgbClr val="000000"/>
-              </a:solidFill>
+            <a:endParaRPr b="0" lang="en-US" sz="3200" spc="-1" strike="noStrike">
               <a:latin typeface="Arial"/>
             </a:endParaRPr>
           </a:p>
@@ -2111,10 +1978,7 @@
             <a:normAutofit/>
           </a:bodyPr>
           <a:p>
-            <a:endParaRPr b="0" lang="en-US" sz="1400" spc="-1" strike="noStrike">
-              <a:solidFill>
-                <a:srgbClr val="000000"/>
-              </a:solidFill>
+            <a:endParaRPr b="0" lang="en-US" sz="3200" spc="-1" strike="noStrike">
               <a:latin typeface="Arial"/>
             </a:endParaRPr>
           </a:p>
@@ -2186,10 +2050,8 @@
         <p:txBody>
           <a:bodyPr lIns="0" rIns="0" tIns="0" bIns="0" anchor="ctr"/>
           <a:p>
-            <a:endParaRPr b="0" lang="en-US" sz="1400" spc="-1" strike="noStrike">
-              <a:solidFill>
-                <a:srgbClr val="000000"/>
-              </a:solidFill>
+            <a:pPr algn="ctr"/>
+            <a:endParaRPr b="0" lang="en-US" sz="4400" spc="-1" strike="noStrike">
               <a:latin typeface="Arial"/>
             </a:endParaRPr>
           </a:p>
@@ -2268,10 +2130,8 @@
         <p:txBody>
           <a:bodyPr lIns="0" rIns="0" tIns="0" bIns="0" anchor="ctr"/>
           <a:p>
-            <a:endParaRPr b="0" lang="en-US" sz="1400" spc="-1" strike="noStrike">
-              <a:solidFill>
-                <a:srgbClr val="000000"/>
-              </a:solidFill>
+            <a:pPr algn="ctr"/>
+            <a:endParaRPr b="0" lang="en-US" sz="4400" spc="-1" strike="noStrike">
               <a:latin typeface="Arial"/>
             </a:endParaRPr>
           </a:p>
@@ -2301,10 +2161,7 @@
             <a:normAutofit/>
           </a:bodyPr>
           <a:p>
-            <a:endParaRPr b="0" lang="en-US" sz="1400" spc="-1" strike="noStrike">
-              <a:solidFill>
-                <a:srgbClr val="000000"/>
-              </a:solidFill>
+            <a:endParaRPr b="0" lang="en-US" sz="3200" spc="-1" strike="noStrike">
               <a:latin typeface="Arial"/>
             </a:endParaRPr>
           </a:p>
@@ -2354,10 +2211,8 @@
         <p:txBody>
           <a:bodyPr lIns="0" rIns="0" tIns="0" bIns="0" anchor="ctr"/>
           <a:p>
-            <a:endParaRPr b="0" lang="en-US" sz="1400" spc="-1" strike="noStrike">
-              <a:solidFill>
-                <a:srgbClr val="000000"/>
-              </a:solidFill>
+            <a:pPr algn="ctr"/>
+            <a:endParaRPr b="0" lang="en-US" sz="4400" spc="-1" strike="noStrike">
               <a:latin typeface="Arial"/>
             </a:endParaRPr>
           </a:p>
@@ -2387,10 +2242,7 @@
             <a:normAutofit/>
           </a:bodyPr>
           <a:p>
-            <a:endParaRPr b="0" lang="en-US" sz="1400" spc="-1" strike="noStrike">
-              <a:solidFill>
-                <a:srgbClr val="000000"/>
-              </a:solidFill>
+            <a:endParaRPr b="0" lang="en-US" sz="3200" spc="-1" strike="noStrike">
               <a:latin typeface="Arial"/>
             </a:endParaRPr>
           </a:p>
@@ -2420,10 +2272,7 @@
             <a:normAutofit/>
           </a:bodyPr>
           <a:p>
-            <a:endParaRPr b="0" lang="en-US" sz="1400" spc="-1" strike="noStrike">
-              <a:solidFill>
-                <a:srgbClr val="000000"/>
-              </a:solidFill>
+            <a:endParaRPr b="0" lang="en-US" sz="3200" spc="-1" strike="noStrike">
               <a:latin typeface="Arial"/>
             </a:endParaRPr>
           </a:p>
@@ -2473,10 +2322,8 @@
         <p:txBody>
           <a:bodyPr lIns="0" rIns="0" tIns="0" bIns="0" anchor="ctr"/>
           <a:p>
-            <a:endParaRPr b="0" lang="en-US" sz="1400" spc="-1" strike="noStrike">
-              <a:solidFill>
-                <a:srgbClr val="000000"/>
-              </a:solidFill>
+            <a:pPr algn="ctr"/>
+            <a:endParaRPr b="0" lang="en-US" sz="4400" spc="-1" strike="noStrike">
               <a:latin typeface="Arial"/>
             </a:endParaRPr>
           </a:p>
@@ -2526,10 +2373,8 @@
         <p:txBody>
           <a:bodyPr lIns="0" rIns="0" tIns="0" bIns="0" anchor="ctr"/>
           <a:p>
-            <a:endParaRPr b="0" lang="en-US" sz="1400" spc="-1" strike="noStrike">
-              <a:solidFill>
-                <a:srgbClr val="000000"/>
-              </a:solidFill>
+            <a:pPr algn="ctr"/>
+            <a:endParaRPr b="0" lang="en-US" sz="4400" spc="-1" strike="noStrike">
               <a:latin typeface="Arial"/>
             </a:endParaRPr>
           </a:p>
@@ -2559,10 +2404,7 @@
             <a:normAutofit/>
           </a:bodyPr>
           <a:p>
-            <a:endParaRPr b="0" lang="en-US" sz="1400" spc="-1" strike="noStrike">
-              <a:solidFill>
-                <a:srgbClr val="000000"/>
-              </a:solidFill>
+            <a:endParaRPr b="0" lang="en-US" sz="3200" spc="-1" strike="noStrike">
               <a:latin typeface="Arial"/>
             </a:endParaRPr>
           </a:p>
@@ -2663,10 +2505,8 @@
         <p:txBody>
           <a:bodyPr lIns="0" rIns="0" tIns="0" bIns="0" anchor="ctr"/>
           <a:p>
-            <a:endParaRPr b="0" lang="en-US" sz="1400" spc="-1" strike="noStrike">
-              <a:solidFill>
-                <a:srgbClr val="000000"/>
-              </a:solidFill>
+            <a:pPr algn="ctr"/>
+            <a:endParaRPr b="0" lang="en-US" sz="4400" spc="-1" strike="noStrike">
               <a:latin typeface="Arial"/>
             </a:endParaRPr>
           </a:p>
@@ -2696,10 +2536,7 @@
             <a:normAutofit/>
           </a:bodyPr>
           <a:p>
-            <a:endParaRPr b="0" lang="en-US" sz="1400" spc="-1" strike="noStrike">
-              <a:solidFill>
-                <a:srgbClr val="000000"/>
-              </a:solidFill>
+            <a:endParaRPr b="0" lang="en-US" sz="3200" spc="-1" strike="noStrike">
               <a:latin typeface="Arial"/>
             </a:endParaRPr>
           </a:p>
@@ -2729,10 +2566,7 @@
             <a:normAutofit/>
           </a:bodyPr>
           <a:p>
-            <a:endParaRPr b="0" lang="en-US" sz="1400" spc="-1" strike="noStrike">
-              <a:solidFill>
-                <a:srgbClr val="000000"/>
-              </a:solidFill>
+            <a:endParaRPr b="0" lang="en-US" sz="3200" spc="-1" strike="noStrike">
               <a:latin typeface="Arial"/>
             </a:endParaRPr>
           </a:p>
@@ -2762,10 +2596,7 @@
             <a:normAutofit/>
           </a:bodyPr>
           <a:p>
-            <a:endParaRPr b="0" lang="en-US" sz="1400" spc="-1" strike="noStrike">
-              <a:solidFill>
-                <a:srgbClr val="000000"/>
-              </a:solidFill>
+            <a:endParaRPr b="0" lang="en-US" sz="3200" spc="-1" strike="noStrike">
               <a:latin typeface="Arial"/>
             </a:endParaRPr>
           </a:p>
@@ -2815,10 +2646,8 @@
         <p:txBody>
           <a:bodyPr lIns="0" rIns="0" tIns="0" bIns="0" anchor="ctr"/>
           <a:p>
-            <a:endParaRPr b="0" lang="en-US" sz="1400" spc="-1" strike="noStrike">
-              <a:solidFill>
-                <a:srgbClr val="000000"/>
-              </a:solidFill>
+            <a:pPr algn="ctr"/>
+            <a:endParaRPr b="0" lang="en-US" sz="4400" spc="-1" strike="noStrike">
               <a:latin typeface="Arial"/>
             </a:endParaRPr>
           </a:p>
@@ -2848,10 +2677,7 @@
             <a:normAutofit/>
           </a:bodyPr>
           <a:p>
-            <a:endParaRPr b="0" lang="en-US" sz="1400" spc="-1" strike="noStrike">
-              <a:solidFill>
-                <a:srgbClr val="000000"/>
-              </a:solidFill>
+            <a:endParaRPr b="0" lang="en-US" sz="3200" spc="-1" strike="noStrike">
               <a:latin typeface="Arial"/>
             </a:endParaRPr>
           </a:p>
@@ -2881,10 +2707,7 @@
             <a:normAutofit/>
           </a:bodyPr>
           <a:p>
-            <a:endParaRPr b="0" lang="en-US" sz="1400" spc="-1" strike="noStrike">
-              <a:solidFill>
-                <a:srgbClr val="000000"/>
-              </a:solidFill>
+            <a:endParaRPr b="0" lang="en-US" sz="3200" spc="-1" strike="noStrike">
               <a:latin typeface="Arial"/>
             </a:endParaRPr>
           </a:p>
@@ -2914,10 +2737,7 @@
             <a:normAutofit/>
           </a:bodyPr>
           <a:p>
-            <a:endParaRPr b="0" lang="en-US" sz="1400" spc="-1" strike="noStrike">
-              <a:solidFill>
-                <a:srgbClr val="000000"/>
-              </a:solidFill>
+            <a:endParaRPr b="0" lang="en-US" sz="3200" spc="-1" strike="noStrike">
               <a:latin typeface="Arial"/>
             </a:endParaRPr>
           </a:p>
@@ -2967,10 +2787,8 @@
         <p:txBody>
           <a:bodyPr lIns="0" rIns="0" tIns="0" bIns="0" anchor="ctr"/>
           <a:p>
-            <a:endParaRPr b="0" lang="en-US" sz="1400" spc="-1" strike="noStrike">
-              <a:solidFill>
-                <a:srgbClr val="000000"/>
-              </a:solidFill>
+            <a:pPr algn="ctr"/>
+            <a:endParaRPr b="0" lang="en-US" sz="4400" spc="-1" strike="noStrike">
               <a:latin typeface="Arial"/>
             </a:endParaRPr>
           </a:p>
@@ -3000,10 +2818,7 @@
             <a:normAutofit/>
           </a:bodyPr>
           <a:p>
-            <a:endParaRPr b="0" lang="en-US" sz="1400" spc="-1" strike="noStrike">
-              <a:solidFill>
-                <a:srgbClr val="000000"/>
-              </a:solidFill>
+            <a:endParaRPr b="0" lang="en-US" sz="3200" spc="-1" strike="noStrike">
               <a:latin typeface="Arial"/>
             </a:endParaRPr>
           </a:p>
@@ -3033,10 +2848,7 @@
             <a:normAutofit/>
           </a:bodyPr>
           <a:p>
-            <a:endParaRPr b="0" lang="en-US" sz="1400" spc="-1" strike="noStrike">
-              <a:solidFill>
-                <a:srgbClr val="000000"/>
-              </a:solidFill>
+            <a:endParaRPr b="0" lang="en-US" sz="3200" spc="-1" strike="noStrike">
               <a:latin typeface="Arial"/>
             </a:endParaRPr>
           </a:p>
@@ -3066,10 +2878,7 @@
             <a:normAutofit/>
           </a:bodyPr>
           <a:p>
-            <a:endParaRPr b="0" lang="en-US" sz="1400" spc="-1" strike="noStrike">
-              <a:solidFill>
-                <a:srgbClr val="000000"/>
-              </a:solidFill>
+            <a:endParaRPr b="0" lang="en-US" sz="3200" spc="-1" strike="noStrike">
               <a:latin typeface="Arial"/>
             </a:endParaRPr>
           </a:p>
@@ -3119,10 +2928,8 @@
         <p:txBody>
           <a:bodyPr lIns="0" rIns="0" tIns="0" bIns="0" anchor="ctr"/>
           <a:p>
-            <a:endParaRPr b="0" lang="en-US" sz="1400" spc="-1" strike="noStrike">
-              <a:solidFill>
-                <a:srgbClr val="000000"/>
-              </a:solidFill>
+            <a:pPr algn="ctr"/>
+            <a:endParaRPr b="0" lang="en-US" sz="4400" spc="-1" strike="noStrike">
               <a:latin typeface="Arial"/>
             </a:endParaRPr>
           </a:p>
@@ -3152,10 +2959,7 @@
             <a:normAutofit/>
           </a:bodyPr>
           <a:p>
-            <a:endParaRPr b="0" lang="en-US" sz="1400" spc="-1" strike="noStrike">
-              <a:solidFill>
-                <a:srgbClr val="000000"/>
-              </a:solidFill>
+            <a:endParaRPr b="0" lang="en-US" sz="3200" spc="-1" strike="noStrike">
               <a:latin typeface="Arial"/>
             </a:endParaRPr>
           </a:p>
@@ -3185,10 +2989,7 @@
             <a:normAutofit/>
           </a:bodyPr>
           <a:p>
-            <a:endParaRPr b="0" lang="en-US" sz="1400" spc="-1" strike="noStrike">
-              <a:solidFill>
-                <a:srgbClr val="000000"/>
-              </a:solidFill>
+            <a:endParaRPr b="0" lang="en-US" sz="3200" spc="-1" strike="noStrike">
               <a:latin typeface="Arial"/>
             </a:endParaRPr>
           </a:p>
@@ -3238,10 +3039,8 @@
         <p:txBody>
           <a:bodyPr lIns="0" rIns="0" tIns="0" bIns="0" anchor="ctr"/>
           <a:p>
-            <a:endParaRPr b="0" lang="en-US" sz="1400" spc="-1" strike="noStrike">
-              <a:solidFill>
-                <a:srgbClr val="000000"/>
-              </a:solidFill>
+            <a:pPr algn="ctr"/>
+            <a:endParaRPr b="0" lang="en-US" sz="4400" spc="-1" strike="noStrike">
               <a:latin typeface="Arial"/>
             </a:endParaRPr>
           </a:p>
@@ -3271,10 +3070,7 @@
             <a:normAutofit/>
           </a:bodyPr>
           <a:p>
-            <a:endParaRPr b="0" lang="en-US" sz="1400" spc="-1" strike="noStrike">
-              <a:solidFill>
-                <a:srgbClr val="000000"/>
-              </a:solidFill>
+            <a:endParaRPr b="0" lang="en-US" sz="3200" spc="-1" strike="noStrike">
               <a:latin typeface="Arial"/>
             </a:endParaRPr>
           </a:p>
@@ -3304,10 +3100,7 @@
             <a:normAutofit/>
           </a:bodyPr>
           <a:p>
-            <a:endParaRPr b="0" lang="en-US" sz="1400" spc="-1" strike="noStrike">
-              <a:solidFill>
-                <a:srgbClr val="000000"/>
-              </a:solidFill>
+            <a:endParaRPr b="0" lang="en-US" sz="3200" spc="-1" strike="noStrike">
               <a:latin typeface="Arial"/>
             </a:endParaRPr>
           </a:p>
@@ -3337,10 +3130,7 @@
             <a:normAutofit/>
           </a:bodyPr>
           <a:p>
-            <a:endParaRPr b="0" lang="en-US" sz="1400" spc="-1" strike="noStrike">
-              <a:solidFill>
-                <a:srgbClr val="000000"/>
-              </a:solidFill>
+            <a:endParaRPr b="0" lang="en-US" sz="3200" spc="-1" strike="noStrike">
               <a:latin typeface="Arial"/>
             </a:endParaRPr>
           </a:p>
@@ -3370,10 +3160,7 @@
             <a:normAutofit/>
           </a:bodyPr>
           <a:p>
-            <a:endParaRPr b="0" lang="en-US" sz="1400" spc="-1" strike="noStrike">
-              <a:solidFill>
-                <a:srgbClr val="000000"/>
-              </a:solidFill>
+            <a:endParaRPr b="0" lang="en-US" sz="3200" spc="-1" strike="noStrike">
               <a:latin typeface="Arial"/>
             </a:endParaRPr>
           </a:p>
@@ -3423,10 +3210,8 @@
         <p:txBody>
           <a:bodyPr lIns="0" rIns="0" tIns="0" bIns="0" anchor="ctr"/>
           <a:p>
-            <a:endParaRPr b="0" lang="en-US" sz="1400" spc="-1" strike="noStrike">
-              <a:solidFill>
-                <a:srgbClr val="000000"/>
-              </a:solidFill>
+            <a:pPr algn="ctr"/>
+            <a:endParaRPr b="0" lang="en-US" sz="4400" spc="-1" strike="noStrike">
               <a:latin typeface="Arial"/>
             </a:endParaRPr>
           </a:p>
@@ -3456,10 +3241,7 @@
             <a:normAutofit/>
           </a:bodyPr>
           <a:p>
-            <a:endParaRPr b="0" lang="en-US" sz="1400" spc="-1" strike="noStrike">
-              <a:solidFill>
-                <a:srgbClr val="000000"/>
-              </a:solidFill>
+            <a:endParaRPr b="0" lang="en-US" sz="3200" spc="-1" strike="noStrike">
               <a:latin typeface="Arial"/>
             </a:endParaRPr>
           </a:p>
@@ -3489,10 +3271,7 @@
             <a:normAutofit/>
           </a:bodyPr>
           <a:p>
-            <a:endParaRPr b="0" lang="en-US" sz="1400" spc="-1" strike="noStrike">
-              <a:solidFill>
-                <a:srgbClr val="000000"/>
-              </a:solidFill>
+            <a:endParaRPr b="0" lang="en-US" sz="3200" spc="-1" strike="noStrike">
               <a:latin typeface="Arial"/>
             </a:endParaRPr>
           </a:p>
@@ -3522,10 +3301,7 @@
             <a:normAutofit/>
           </a:bodyPr>
           <a:p>
-            <a:endParaRPr b="0" lang="en-US" sz="1400" spc="-1" strike="noStrike">
-              <a:solidFill>
-                <a:srgbClr val="000000"/>
-              </a:solidFill>
+            <a:endParaRPr b="0" lang="en-US" sz="3200" spc="-1" strike="noStrike">
               <a:latin typeface="Arial"/>
             </a:endParaRPr>
           </a:p>
@@ -3555,10 +3331,7 @@
             <a:normAutofit/>
           </a:bodyPr>
           <a:p>
-            <a:endParaRPr b="0" lang="en-US" sz="1400" spc="-1" strike="noStrike">
-              <a:solidFill>
-                <a:srgbClr val="000000"/>
-              </a:solidFill>
+            <a:endParaRPr b="0" lang="en-US" sz="3200" spc="-1" strike="noStrike">
               <a:latin typeface="Arial"/>
             </a:endParaRPr>
           </a:p>
@@ -3588,10 +3361,7 @@
             <a:normAutofit/>
           </a:bodyPr>
           <a:p>
-            <a:endParaRPr b="0" lang="en-US" sz="1400" spc="-1" strike="noStrike">
-              <a:solidFill>
-                <a:srgbClr val="000000"/>
-              </a:solidFill>
+            <a:endParaRPr b="0" lang="en-US" sz="3200" spc="-1" strike="noStrike">
               <a:latin typeface="Arial"/>
             </a:endParaRPr>
           </a:p>
@@ -3621,10 +3391,7 @@
             <a:normAutofit/>
           </a:bodyPr>
           <a:p>
-            <a:endParaRPr b="0" lang="en-US" sz="1400" spc="-1" strike="noStrike">
-              <a:solidFill>
-                <a:srgbClr val="000000"/>
-              </a:solidFill>
+            <a:endParaRPr b="0" lang="en-US" sz="3200" spc="-1" strike="noStrike">
               <a:latin typeface="Arial"/>
             </a:endParaRPr>
           </a:p>
@@ -3696,10 +3463,8 @@
         <p:txBody>
           <a:bodyPr lIns="0" rIns="0" tIns="0" bIns="0" anchor="ctr"/>
           <a:p>
-            <a:endParaRPr b="0" lang="en-US" sz="1400" spc="-1" strike="noStrike">
-              <a:solidFill>
-                <a:srgbClr val="000000"/>
-              </a:solidFill>
+            <a:pPr algn="ctr"/>
+            <a:endParaRPr b="0" lang="en-US" sz="4400" spc="-1" strike="noStrike">
               <a:latin typeface="Arial"/>
             </a:endParaRPr>
           </a:p>
@@ -3778,10 +3543,8 @@
         <p:txBody>
           <a:bodyPr lIns="0" rIns="0" tIns="0" bIns="0" anchor="ctr"/>
           <a:p>
-            <a:endParaRPr b="0" lang="en-US" sz="1400" spc="-1" strike="noStrike">
-              <a:solidFill>
-                <a:srgbClr val="000000"/>
-              </a:solidFill>
+            <a:pPr algn="ctr"/>
+            <a:endParaRPr b="0" lang="en-US" sz="4400" spc="-1" strike="noStrike">
               <a:latin typeface="Arial"/>
             </a:endParaRPr>
           </a:p>
@@ -3811,10 +3574,7 @@
             <a:normAutofit/>
           </a:bodyPr>
           <a:p>
-            <a:endParaRPr b="0" lang="en-US" sz="1400" spc="-1" strike="noStrike">
-              <a:solidFill>
-                <a:srgbClr val="000000"/>
-              </a:solidFill>
+            <a:endParaRPr b="0" lang="en-US" sz="3200" spc="-1" strike="noStrike">
               <a:latin typeface="Arial"/>
             </a:endParaRPr>
           </a:p>
@@ -3864,10 +3624,8 @@
         <p:txBody>
           <a:bodyPr lIns="0" rIns="0" tIns="0" bIns="0" anchor="ctr"/>
           <a:p>
-            <a:endParaRPr b="0" lang="en-US" sz="1400" spc="-1" strike="noStrike">
-              <a:solidFill>
-                <a:srgbClr val="000000"/>
-              </a:solidFill>
+            <a:pPr algn="ctr"/>
+            <a:endParaRPr b="0" lang="en-US" sz="4400" spc="-1" strike="noStrike">
               <a:latin typeface="Arial"/>
             </a:endParaRPr>
           </a:p>
@@ -3897,10 +3655,7 @@
             <a:normAutofit/>
           </a:bodyPr>
           <a:p>
-            <a:endParaRPr b="0" lang="en-US" sz="1400" spc="-1" strike="noStrike">
-              <a:solidFill>
-                <a:srgbClr val="000000"/>
-              </a:solidFill>
+            <a:endParaRPr b="0" lang="en-US" sz="3200" spc="-1" strike="noStrike">
               <a:latin typeface="Arial"/>
             </a:endParaRPr>
           </a:p>
@@ -3930,10 +3685,7 @@
             <a:normAutofit/>
           </a:bodyPr>
           <a:p>
-            <a:endParaRPr b="0" lang="en-US" sz="1400" spc="-1" strike="noStrike">
-              <a:solidFill>
-                <a:srgbClr val="000000"/>
-              </a:solidFill>
+            <a:endParaRPr b="0" lang="en-US" sz="3200" spc="-1" strike="noStrike">
               <a:latin typeface="Arial"/>
             </a:endParaRPr>
           </a:p>
@@ -3983,10 +3735,8 @@
         <p:txBody>
           <a:bodyPr lIns="0" rIns="0" tIns="0" bIns="0" anchor="ctr"/>
           <a:p>
-            <a:endParaRPr b="0" lang="en-US" sz="1400" spc="-1" strike="noStrike">
-              <a:solidFill>
-                <a:srgbClr val="000000"/>
-              </a:solidFill>
+            <a:pPr algn="ctr"/>
+            <a:endParaRPr b="0" lang="en-US" sz="4400" spc="-1" strike="noStrike">
               <a:latin typeface="Arial"/>
             </a:endParaRPr>
           </a:p>
@@ -4016,10 +3766,7 @@
             <a:normAutofit/>
           </a:bodyPr>
           <a:p>
-            <a:endParaRPr b="0" lang="en-US" sz="1400" spc="-1" strike="noStrike">
-              <a:solidFill>
-                <a:srgbClr val="000000"/>
-              </a:solidFill>
+            <a:endParaRPr b="0" lang="en-US" sz="3200" spc="-1" strike="noStrike">
               <a:latin typeface="Arial"/>
             </a:endParaRPr>
           </a:p>
@@ -4049,10 +3796,7 @@
             <a:normAutofit/>
           </a:bodyPr>
           <a:p>
-            <a:endParaRPr b="0" lang="en-US" sz="1400" spc="-1" strike="noStrike">
-              <a:solidFill>
-                <a:srgbClr val="000000"/>
-              </a:solidFill>
+            <a:endParaRPr b="0" lang="en-US" sz="3200" spc="-1" strike="noStrike">
               <a:latin typeface="Arial"/>
             </a:endParaRPr>
           </a:p>
@@ -4102,10 +3846,8 @@
         <p:txBody>
           <a:bodyPr lIns="0" rIns="0" tIns="0" bIns="0" anchor="ctr"/>
           <a:p>
-            <a:endParaRPr b="0" lang="en-US" sz="1400" spc="-1" strike="noStrike">
-              <a:solidFill>
-                <a:srgbClr val="000000"/>
-              </a:solidFill>
+            <a:pPr algn="ctr"/>
+            <a:endParaRPr b="0" lang="en-US" sz="4400" spc="-1" strike="noStrike">
               <a:latin typeface="Arial"/>
             </a:endParaRPr>
           </a:p>
@@ -4206,10 +3948,8 @@
         <p:txBody>
           <a:bodyPr lIns="0" rIns="0" tIns="0" bIns="0" anchor="ctr"/>
           <a:p>
-            <a:endParaRPr b="0" lang="en-US" sz="1400" spc="-1" strike="noStrike">
-              <a:solidFill>
-                <a:srgbClr val="000000"/>
-              </a:solidFill>
+            <a:pPr algn="ctr"/>
+            <a:endParaRPr b="0" lang="en-US" sz="4400" spc="-1" strike="noStrike">
               <a:latin typeface="Arial"/>
             </a:endParaRPr>
           </a:p>
@@ -4239,10 +3979,7 @@
             <a:normAutofit/>
           </a:bodyPr>
           <a:p>
-            <a:endParaRPr b="0" lang="en-US" sz="1400" spc="-1" strike="noStrike">
-              <a:solidFill>
-                <a:srgbClr val="000000"/>
-              </a:solidFill>
+            <a:endParaRPr b="0" lang="en-US" sz="3200" spc="-1" strike="noStrike">
               <a:latin typeface="Arial"/>
             </a:endParaRPr>
           </a:p>
@@ -4272,10 +4009,7 @@
             <a:normAutofit/>
           </a:bodyPr>
           <a:p>
-            <a:endParaRPr b="0" lang="en-US" sz="1400" spc="-1" strike="noStrike">
-              <a:solidFill>
-                <a:srgbClr val="000000"/>
-              </a:solidFill>
+            <a:endParaRPr b="0" lang="en-US" sz="3200" spc="-1" strike="noStrike">
               <a:latin typeface="Arial"/>
             </a:endParaRPr>
           </a:p>
@@ -4305,10 +4039,7 @@
             <a:normAutofit/>
           </a:bodyPr>
           <a:p>
-            <a:endParaRPr b="0" lang="en-US" sz="1400" spc="-1" strike="noStrike">
-              <a:solidFill>
-                <a:srgbClr val="000000"/>
-              </a:solidFill>
+            <a:endParaRPr b="0" lang="en-US" sz="3200" spc="-1" strike="noStrike">
               <a:latin typeface="Arial"/>
             </a:endParaRPr>
           </a:p>
@@ -4358,10 +4089,8 @@
         <p:txBody>
           <a:bodyPr lIns="0" rIns="0" tIns="0" bIns="0" anchor="ctr"/>
           <a:p>
-            <a:endParaRPr b="0" lang="en-US" sz="1400" spc="-1" strike="noStrike">
-              <a:solidFill>
-                <a:srgbClr val="000000"/>
-              </a:solidFill>
+            <a:pPr algn="ctr"/>
+            <a:endParaRPr b="0" lang="en-US" sz="4400" spc="-1" strike="noStrike">
               <a:latin typeface="Arial"/>
             </a:endParaRPr>
           </a:p>
@@ -4391,10 +4120,7 @@
             <a:normAutofit/>
           </a:bodyPr>
           <a:p>
-            <a:endParaRPr b="0" lang="en-US" sz="1400" spc="-1" strike="noStrike">
-              <a:solidFill>
-                <a:srgbClr val="000000"/>
-              </a:solidFill>
+            <a:endParaRPr b="0" lang="en-US" sz="3200" spc="-1" strike="noStrike">
               <a:latin typeface="Arial"/>
             </a:endParaRPr>
           </a:p>
@@ -4424,10 +4150,7 @@
             <a:normAutofit/>
           </a:bodyPr>
           <a:p>
-            <a:endParaRPr b="0" lang="en-US" sz="1400" spc="-1" strike="noStrike">
-              <a:solidFill>
-                <a:srgbClr val="000000"/>
-              </a:solidFill>
+            <a:endParaRPr b="0" lang="en-US" sz="3200" spc="-1" strike="noStrike">
               <a:latin typeface="Arial"/>
             </a:endParaRPr>
           </a:p>
@@ -4457,10 +4180,7 @@
             <a:normAutofit/>
           </a:bodyPr>
           <a:p>
-            <a:endParaRPr b="0" lang="en-US" sz="1400" spc="-1" strike="noStrike">
-              <a:solidFill>
-                <a:srgbClr val="000000"/>
-              </a:solidFill>
+            <a:endParaRPr b="0" lang="en-US" sz="3200" spc="-1" strike="noStrike">
               <a:latin typeface="Arial"/>
             </a:endParaRPr>
           </a:p>
@@ -4510,10 +4230,8 @@
         <p:txBody>
           <a:bodyPr lIns="0" rIns="0" tIns="0" bIns="0" anchor="ctr"/>
           <a:p>
-            <a:endParaRPr b="0" lang="en-US" sz="1400" spc="-1" strike="noStrike">
-              <a:solidFill>
-                <a:srgbClr val="000000"/>
-              </a:solidFill>
+            <a:pPr algn="ctr"/>
+            <a:endParaRPr b="0" lang="en-US" sz="4400" spc="-1" strike="noStrike">
               <a:latin typeface="Arial"/>
             </a:endParaRPr>
           </a:p>
@@ -4543,10 +4261,7 @@
             <a:normAutofit/>
           </a:bodyPr>
           <a:p>
-            <a:endParaRPr b="0" lang="en-US" sz="1400" spc="-1" strike="noStrike">
-              <a:solidFill>
-                <a:srgbClr val="000000"/>
-              </a:solidFill>
+            <a:endParaRPr b="0" lang="en-US" sz="3200" spc="-1" strike="noStrike">
               <a:latin typeface="Arial"/>
             </a:endParaRPr>
           </a:p>
@@ -4576,10 +4291,7 @@
             <a:normAutofit/>
           </a:bodyPr>
           <a:p>
-            <a:endParaRPr b="0" lang="en-US" sz="1400" spc="-1" strike="noStrike">
-              <a:solidFill>
-                <a:srgbClr val="000000"/>
-              </a:solidFill>
+            <a:endParaRPr b="0" lang="en-US" sz="3200" spc="-1" strike="noStrike">
               <a:latin typeface="Arial"/>
             </a:endParaRPr>
           </a:p>
@@ -4609,10 +4321,7 @@
             <a:normAutofit/>
           </a:bodyPr>
           <a:p>
-            <a:endParaRPr b="0" lang="en-US" sz="1400" spc="-1" strike="noStrike">
-              <a:solidFill>
-                <a:srgbClr val="000000"/>
-              </a:solidFill>
+            <a:endParaRPr b="0" lang="en-US" sz="3200" spc="-1" strike="noStrike">
               <a:latin typeface="Arial"/>
             </a:endParaRPr>
           </a:p>
@@ -4662,10 +4371,8 @@
         <p:txBody>
           <a:bodyPr lIns="0" rIns="0" tIns="0" bIns="0" anchor="ctr"/>
           <a:p>
-            <a:endParaRPr b="0" lang="en-US" sz="1400" spc="-1" strike="noStrike">
-              <a:solidFill>
-                <a:srgbClr val="000000"/>
-              </a:solidFill>
+            <a:pPr algn="ctr"/>
+            <a:endParaRPr b="0" lang="en-US" sz="4400" spc="-1" strike="noStrike">
               <a:latin typeface="Arial"/>
             </a:endParaRPr>
           </a:p>
@@ -4695,10 +4402,7 @@
             <a:normAutofit/>
           </a:bodyPr>
           <a:p>
-            <a:endParaRPr b="0" lang="en-US" sz="1400" spc="-1" strike="noStrike">
-              <a:solidFill>
-                <a:srgbClr val="000000"/>
-              </a:solidFill>
+            <a:endParaRPr b="0" lang="en-US" sz="3200" spc="-1" strike="noStrike">
               <a:latin typeface="Arial"/>
             </a:endParaRPr>
           </a:p>
@@ -4728,10 +4432,7 @@
             <a:normAutofit/>
           </a:bodyPr>
           <a:p>
-            <a:endParaRPr b="0" lang="en-US" sz="1400" spc="-1" strike="noStrike">
-              <a:solidFill>
-                <a:srgbClr val="000000"/>
-              </a:solidFill>
+            <a:endParaRPr b="0" lang="en-US" sz="3200" spc="-1" strike="noStrike">
               <a:latin typeface="Arial"/>
             </a:endParaRPr>
           </a:p>
@@ -4781,10 +4482,8 @@
         <p:txBody>
           <a:bodyPr lIns="0" rIns="0" tIns="0" bIns="0" anchor="ctr"/>
           <a:p>
-            <a:endParaRPr b="0" lang="en-US" sz="1400" spc="-1" strike="noStrike">
-              <a:solidFill>
-                <a:srgbClr val="000000"/>
-              </a:solidFill>
+            <a:pPr algn="ctr"/>
+            <a:endParaRPr b="0" lang="en-US" sz="4400" spc="-1" strike="noStrike">
               <a:latin typeface="Arial"/>
             </a:endParaRPr>
           </a:p>
@@ -4814,10 +4513,7 @@
             <a:normAutofit/>
           </a:bodyPr>
           <a:p>
-            <a:endParaRPr b="0" lang="en-US" sz="1400" spc="-1" strike="noStrike">
-              <a:solidFill>
-                <a:srgbClr val="000000"/>
-              </a:solidFill>
+            <a:endParaRPr b="0" lang="en-US" sz="3200" spc="-1" strike="noStrike">
               <a:latin typeface="Arial"/>
             </a:endParaRPr>
           </a:p>
@@ -4847,10 +4543,7 @@
             <a:normAutofit/>
           </a:bodyPr>
           <a:p>
-            <a:endParaRPr b="0" lang="en-US" sz="1400" spc="-1" strike="noStrike">
-              <a:solidFill>
-                <a:srgbClr val="000000"/>
-              </a:solidFill>
+            <a:endParaRPr b="0" lang="en-US" sz="3200" spc="-1" strike="noStrike">
               <a:latin typeface="Arial"/>
             </a:endParaRPr>
           </a:p>
@@ -4880,10 +4573,7 @@
             <a:normAutofit/>
           </a:bodyPr>
           <a:p>
-            <a:endParaRPr b="0" lang="en-US" sz="1400" spc="-1" strike="noStrike">
-              <a:solidFill>
-                <a:srgbClr val="000000"/>
-              </a:solidFill>
+            <a:endParaRPr b="0" lang="en-US" sz="3200" spc="-1" strike="noStrike">
               <a:latin typeface="Arial"/>
             </a:endParaRPr>
           </a:p>
@@ -4913,10 +4603,7 @@
             <a:normAutofit/>
           </a:bodyPr>
           <a:p>
-            <a:endParaRPr b="0" lang="en-US" sz="1400" spc="-1" strike="noStrike">
-              <a:solidFill>
-                <a:srgbClr val="000000"/>
-              </a:solidFill>
+            <a:endParaRPr b="0" lang="en-US" sz="3200" spc="-1" strike="noStrike">
               <a:latin typeface="Arial"/>
             </a:endParaRPr>
           </a:p>
@@ -4966,10 +4653,8 @@
         <p:txBody>
           <a:bodyPr lIns="0" rIns="0" tIns="0" bIns="0" anchor="ctr"/>
           <a:p>
-            <a:endParaRPr b="0" lang="en-US" sz="1400" spc="-1" strike="noStrike">
-              <a:solidFill>
-                <a:srgbClr val="000000"/>
-              </a:solidFill>
+            <a:pPr algn="ctr"/>
+            <a:endParaRPr b="0" lang="en-US" sz="4400" spc="-1" strike="noStrike">
               <a:latin typeface="Arial"/>
             </a:endParaRPr>
           </a:p>
@@ -4999,10 +4684,7 @@
             <a:normAutofit/>
           </a:bodyPr>
           <a:p>
-            <a:endParaRPr b="0" lang="en-US" sz="1400" spc="-1" strike="noStrike">
-              <a:solidFill>
-                <a:srgbClr val="000000"/>
-              </a:solidFill>
+            <a:endParaRPr b="0" lang="en-US" sz="3200" spc="-1" strike="noStrike">
               <a:latin typeface="Arial"/>
             </a:endParaRPr>
           </a:p>
@@ -5032,10 +4714,7 @@
             <a:normAutofit/>
           </a:bodyPr>
           <a:p>
-            <a:endParaRPr b="0" lang="en-US" sz="1400" spc="-1" strike="noStrike">
-              <a:solidFill>
-                <a:srgbClr val="000000"/>
-              </a:solidFill>
+            <a:endParaRPr b="0" lang="en-US" sz="3200" spc="-1" strike="noStrike">
               <a:latin typeface="Arial"/>
             </a:endParaRPr>
           </a:p>
@@ -5065,10 +4744,7 @@
             <a:normAutofit/>
           </a:bodyPr>
           <a:p>
-            <a:endParaRPr b="0" lang="en-US" sz="1400" spc="-1" strike="noStrike">
-              <a:solidFill>
-                <a:srgbClr val="000000"/>
-              </a:solidFill>
+            <a:endParaRPr b="0" lang="en-US" sz="3200" spc="-1" strike="noStrike">
               <a:latin typeface="Arial"/>
             </a:endParaRPr>
           </a:p>
@@ -5098,10 +4774,7 @@
             <a:normAutofit/>
           </a:bodyPr>
           <a:p>
-            <a:endParaRPr b="0" lang="en-US" sz="1400" spc="-1" strike="noStrike">
-              <a:solidFill>
-                <a:srgbClr val="000000"/>
-              </a:solidFill>
+            <a:endParaRPr b="0" lang="en-US" sz="3200" spc="-1" strike="noStrike">
               <a:latin typeface="Arial"/>
             </a:endParaRPr>
           </a:p>
@@ -5131,10 +4804,7 @@
             <a:normAutofit/>
           </a:bodyPr>
           <a:p>
-            <a:endParaRPr b="0" lang="en-US" sz="1400" spc="-1" strike="noStrike">
-              <a:solidFill>
-                <a:srgbClr val="000000"/>
-              </a:solidFill>
+            <a:endParaRPr b="0" lang="en-US" sz="3200" spc="-1" strike="noStrike">
               <a:latin typeface="Arial"/>
             </a:endParaRPr>
           </a:p>
@@ -5164,10 +4834,7 @@
             <a:normAutofit/>
           </a:bodyPr>
           <a:p>
-            <a:endParaRPr b="0" lang="en-US" sz="1400" spc="-1" strike="noStrike">
-              <a:solidFill>
-                <a:srgbClr val="000000"/>
-              </a:solidFill>
+            <a:endParaRPr b="0" lang="en-US" sz="3200" spc="-1" strike="noStrike">
               <a:latin typeface="Arial"/>
             </a:endParaRPr>
           </a:p>
@@ -5217,10 +4884,8 @@
         <p:txBody>
           <a:bodyPr lIns="0" rIns="0" tIns="0" bIns="0" anchor="ctr"/>
           <a:p>
-            <a:endParaRPr b="0" lang="en-US" sz="1400" spc="-1" strike="noStrike">
-              <a:solidFill>
-                <a:srgbClr val="000000"/>
-              </a:solidFill>
+            <a:pPr algn="ctr"/>
+            <a:endParaRPr b="0" lang="en-US" sz="4400" spc="-1" strike="noStrike">
               <a:latin typeface="Arial"/>
             </a:endParaRPr>
           </a:p>
@@ -5321,10 +4986,8 @@
         <p:txBody>
           <a:bodyPr lIns="0" rIns="0" tIns="0" bIns="0" anchor="ctr"/>
           <a:p>
-            <a:endParaRPr b="0" lang="en-US" sz="1400" spc="-1" strike="noStrike">
-              <a:solidFill>
-                <a:srgbClr val="000000"/>
-              </a:solidFill>
+            <a:pPr algn="ctr"/>
+            <a:endParaRPr b="0" lang="en-US" sz="4400" spc="-1" strike="noStrike">
               <a:latin typeface="Arial"/>
             </a:endParaRPr>
           </a:p>
@@ -5354,10 +5017,7 @@
             <a:normAutofit/>
           </a:bodyPr>
           <a:p>
-            <a:endParaRPr b="0" lang="en-US" sz="1400" spc="-1" strike="noStrike">
-              <a:solidFill>
-                <a:srgbClr val="000000"/>
-              </a:solidFill>
+            <a:endParaRPr b="0" lang="en-US" sz="3200" spc="-1" strike="noStrike">
               <a:latin typeface="Arial"/>
             </a:endParaRPr>
           </a:p>
@@ -5387,10 +5047,7 @@
             <a:normAutofit/>
           </a:bodyPr>
           <a:p>
-            <a:endParaRPr b="0" lang="en-US" sz="1400" spc="-1" strike="noStrike">
-              <a:solidFill>
-                <a:srgbClr val="000000"/>
-              </a:solidFill>
+            <a:endParaRPr b="0" lang="en-US" sz="3200" spc="-1" strike="noStrike">
               <a:latin typeface="Arial"/>
             </a:endParaRPr>
           </a:p>
@@ -5420,10 +5077,7 @@
             <a:normAutofit/>
           </a:bodyPr>
           <a:p>
-            <a:endParaRPr b="0" lang="en-US" sz="1400" spc="-1" strike="noStrike">
-              <a:solidFill>
-                <a:srgbClr val="000000"/>
-              </a:solidFill>
+            <a:endParaRPr b="0" lang="en-US" sz="3200" spc="-1" strike="noStrike">
               <a:latin typeface="Arial"/>
             </a:endParaRPr>
           </a:p>
@@ -5473,10 +5127,8 @@
         <p:txBody>
           <a:bodyPr lIns="0" rIns="0" tIns="0" bIns="0" anchor="ctr"/>
           <a:p>
-            <a:endParaRPr b="0" lang="en-US" sz="1400" spc="-1" strike="noStrike">
-              <a:solidFill>
-                <a:srgbClr val="000000"/>
-              </a:solidFill>
+            <a:pPr algn="ctr"/>
+            <a:endParaRPr b="0" lang="en-US" sz="4400" spc="-1" strike="noStrike">
               <a:latin typeface="Arial"/>
             </a:endParaRPr>
           </a:p>
@@ -5506,10 +5158,7 @@
             <a:normAutofit/>
           </a:bodyPr>
           <a:p>
-            <a:endParaRPr b="0" lang="en-US" sz="1400" spc="-1" strike="noStrike">
-              <a:solidFill>
-                <a:srgbClr val="000000"/>
-              </a:solidFill>
+            <a:endParaRPr b="0" lang="en-US" sz="3200" spc="-1" strike="noStrike">
               <a:latin typeface="Arial"/>
             </a:endParaRPr>
           </a:p>
@@ -5539,10 +5188,7 @@
             <a:normAutofit/>
           </a:bodyPr>
           <a:p>
-            <a:endParaRPr b="0" lang="en-US" sz="1400" spc="-1" strike="noStrike">
-              <a:solidFill>
-                <a:srgbClr val="000000"/>
-              </a:solidFill>
+            <a:endParaRPr b="0" lang="en-US" sz="3200" spc="-1" strike="noStrike">
               <a:latin typeface="Arial"/>
             </a:endParaRPr>
           </a:p>
@@ -5572,10 +5218,7 @@
             <a:normAutofit/>
           </a:bodyPr>
           <a:p>
-            <a:endParaRPr b="0" lang="en-US" sz="1400" spc="-1" strike="noStrike">
-              <a:solidFill>
-                <a:srgbClr val="000000"/>
-              </a:solidFill>
+            <a:endParaRPr b="0" lang="en-US" sz="3200" spc="-1" strike="noStrike">
               <a:latin typeface="Arial"/>
             </a:endParaRPr>
           </a:p>
@@ -5625,10 +5268,8 @@
         <p:txBody>
           <a:bodyPr lIns="0" rIns="0" tIns="0" bIns="0" anchor="ctr"/>
           <a:p>
-            <a:endParaRPr b="0" lang="en-US" sz="1400" spc="-1" strike="noStrike">
-              <a:solidFill>
-                <a:srgbClr val="000000"/>
-              </a:solidFill>
+            <a:pPr algn="ctr"/>
+            <a:endParaRPr b="0" lang="en-US" sz="4400" spc="-1" strike="noStrike">
               <a:latin typeface="Arial"/>
             </a:endParaRPr>
           </a:p>
@@ -5658,10 +5299,7 @@
             <a:normAutofit/>
           </a:bodyPr>
           <a:p>
-            <a:endParaRPr b="0" lang="en-US" sz="1400" spc="-1" strike="noStrike">
-              <a:solidFill>
-                <a:srgbClr val="000000"/>
-              </a:solidFill>
+            <a:endParaRPr b="0" lang="en-US" sz="3200" spc="-1" strike="noStrike">
               <a:latin typeface="Arial"/>
             </a:endParaRPr>
           </a:p>
@@ -5691,10 +5329,7 @@
             <a:normAutofit/>
           </a:bodyPr>
           <a:p>
-            <a:endParaRPr b="0" lang="en-US" sz="1400" spc="-1" strike="noStrike">
-              <a:solidFill>
-                <a:srgbClr val="000000"/>
-              </a:solidFill>
+            <a:endParaRPr b="0" lang="en-US" sz="3200" spc="-1" strike="noStrike">
               <a:latin typeface="Arial"/>
             </a:endParaRPr>
           </a:p>
@@ -5724,10 +5359,7 @@
             <a:normAutofit/>
           </a:bodyPr>
           <a:p>
-            <a:endParaRPr b="0" lang="en-US" sz="1400" spc="-1" strike="noStrike">
-              <a:solidFill>
-                <a:srgbClr val="000000"/>
-              </a:solidFill>
+            <a:endParaRPr b="0" lang="en-US" sz="3200" spc="-1" strike="noStrike">
               <a:latin typeface="Arial"/>
             </a:endParaRPr>
           </a:p>
@@ -5775,7 +5407,7 @@
         <p:spPr>
           <a:xfrm>
             <a:off x="0" y="5104800"/>
-            <a:ext cx="10079280" cy="580320"/>
+            <a:ext cx="10078920" cy="579960"/>
           </a:xfrm>
           <a:prstGeom prst="rect">
             <a:avLst/>
@@ -5798,7 +5430,7 @@
         <p:spPr>
           <a:xfrm>
             <a:off x="0" y="0"/>
-            <a:ext cx="10079280" cy="323280"/>
+            <a:ext cx="10078920" cy="322920"/>
           </a:xfrm>
           <a:prstGeom prst="rect">
             <a:avLst/>
@@ -5820,8 +5452,8 @@
         </p:nvSpPr>
         <p:spPr>
           <a:xfrm>
-            <a:off x="504000" y="565560"/>
-            <a:ext cx="9070920" cy="945720"/>
+            <a:off x="504000" y="226080"/>
+            <a:ext cx="9072000" cy="946440"/>
           </a:xfrm>
           <a:prstGeom prst="rect">
             <a:avLst/>
@@ -5830,19 +5462,14 @@
         <p:txBody>
           <a:bodyPr lIns="0" rIns="0" tIns="0" bIns="0" anchor="ctr"/>
           <a:p>
+            <a:pPr algn="ctr"/>
             <a:r>
               <a:rPr b="0" lang="en-US" sz="4400" spc="-1" strike="noStrike">
-                <a:solidFill>
-                  <a:srgbClr val="000000"/>
-                </a:solidFill>
                 <a:latin typeface="Arial"/>
               </a:rPr>
               <a:t>Click to edit the title text format</a:t>
             </a:r>
             <a:endParaRPr b="0" lang="en-US" sz="4400" spc="-1" strike="noStrike">
-              <a:solidFill>
-                <a:srgbClr val="000000"/>
-              </a:solidFill>
               <a:latin typeface="Arial"/>
             </a:endParaRPr>
           </a:p>
@@ -5860,15 +5487,17 @@
         </p:nvSpPr>
         <p:spPr>
           <a:xfrm>
-            <a:off x="504000" y="1656000"/>
-            <a:ext cx="9070920" cy="2958120"/>
+            <a:off x="504000" y="1326600"/>
+            <a:ext cx="9072000" cy="3288600"/>
           </a:xfrm>
           <a:prstGeom prst="rect">
             <a:avLst/>
           </a:prstGeom>
         </p:spPr>
         <p:txBody>
-          <a:bodyPr lIns="0" rIns="0" tIns="0" bIns="0"/>
+          <a:bodyPr lIns="0" rIns="0" tIns="0" bIns="0">
+            <a:normAutofit/>
+          </a:bodyPr>
           <a:p>
             <a:pPr marL="432000" indent="-324000">
               <a:spcBef>
@@ -5882,18 +5511,12 @@
               <a:buChar char=""/>
             </a:pPr>
             <a:r>
-              <a:rPr b="0" lang="en-US" sz="2800" spc="-1" strike="noStrike">
-                <a:solidFill>
-                  <a:srgbClr val="000000"/>
-                </a:solidFill>
+              <a:rPr b="0" lang="en-US" sz="3200" spc="-1" strike="noStrike">
                 <a:latin typeface="Arial"/>
               </a:rPr>
               <a:t>Click to edit the outline text format</a:t>
             </a:r>
-            <a:endParaRPr b="0" lang="en-US" sz="2800" spc="-1" strike="noStrike">
-              <a:solidFill>
-                <a:srgbClr val="000000"/>
-              </a:solidFill>
+            <a:endParaRPr b="0" lang="en-US" sz="3200" spc="-1" strike="noStrike">
               <a:latin typeface="Arial"/>
             </a:endParaRPr>
           </a:p>
@@ -5911,17 +5534,11 @@
             </a:pPr>
             <a:r>
               <a:rPr b="0" lang="en-US" sz="2800" spc="-1" strike="noStrike">
-                <a:solidFill>
-                  <a:srgbClr val="000000"/>
-                </a:solidFill>
                 <a:latin typeface="Arial"/>
               </a:rPr>
               <a:t>Second Outline Level</a:t>
             </a:r>
             <a:endParaRPr b="0" lang="en-US" sz="2800" spc="-1" strike="noStrike">
-              <a:solidFill>
-                <a:srgbClr val="000000"/>
-              </a:solidFill>
               <a:latin typeface="Arial"/>
             </a:endParaRPr>
           </a:p>
@@ -5938,18 +5555,12 @@
               <a:buChar char=""/>
             </a:pPr>
             <a:r>
-              <a:rPr b="0" lang="en-US" sz="2800" spc="-1" strike="noStrike">
-                <a:solidFill>
-                  <a:srgbClr val="000000"/>
-                </a:solidFill>
+              <a:rPr b="0" lang="en-US" sz="2400" spc="-1" strike="noStrike">
                 <a:latin typeface="Arial"/>
               </a:rPr>
               <a:t>Third Outline Level</a:t>
             </a:r>
-            <a:endParaRPr b="0" lang="en-US" sz="2800" spc="-1" strike="noStrike">
-              <a:solidFill>
-                <a:srgbClr val="000000"/>
-              </a:solidFill>
+            <a:endParaRPr b="0" lang="en-US" sz="2400" spc="-1" strike="noStrike">
               <a:latin typeface="Arial"/>
             </a:endParaRPr>
           </a:p>
@@ -5966,18 +5577,12 @@
               <a:buChar char=""/>
             </a:pPr>
             <a:r>
-              <a:rPr b="0" lang="en-US" sz="2800" spc="-1" strike="noStrike">
-                <a:solidFill>
-                  <a:srgbClr val="000000"/>
-                </a:solidFill>
+              <a:rPr b="0" lang="en-US" sz="2000" spc="-1" strike="noStrike">
                 <a:latin typeface="Arial"/>
               </a:rPr>
               <a:t>Fourth Outline Level</a:t>
             </a:r>
-            <a:endParaRPr b="0" lang="en-US" sz="2800" spc="-1" strike="noStrike">
-              <a:solidFill>
-                <a:srgbClr val="000000"/>
-              </a:solidFill>
+            <a:endParaRPr b="0" lang="en-US" sz="2000" spc="-1" strike="noStrike">
               <a:latin typeface="Arial"/>
             </a:endParaRPr>
           </a:p>
@@ -5994,18 +5599,12 @@
               <a:buChar char=""/>
             </a:pPr>
             <a:r>
-              <a:rPr b="0" lang="en-US" sz="2800" spc="-1" strike="noStrike">
-                <a:solidFill>
-                  <a:srgbClr val="000000"/>
-                </a:solidFill>
+              <a:rPr b="0" lang="en-US" sz="2000" spc="-1" strike="noStrike">
                 <a:latin typeface="Arial"/>
               </a:rPr>
               <a:t>Fifth Outline Level</a:t>
             </a:r>
-            <a:endParaRPr b="0" lang="en-US" sz="2800" spc="-1" strike="noStrike">
-              <a:solidFill>
-                <a:srgbClr val="000000"/>
-              </a:solidFill>
+            <a:endParaRPr b="0" lang="en-US" sz="2000" spc="-1" strike="noStrike">
               <a:latin typeface="Arial"/>
             </a:endParaRPr>
           </a:p>
@@ -6022,18 +5621,12 @@
               <a:buChar char=""/>
             </a:pPr>
             <a:r>
-              <a:rPr b="0" lang="en-US" sz="2800" spc="-1" strike="noStrike">
-                <a:solidFill>
-                  <a:srgbClr val="000000"/>
-                </a:solidFill>
+              <a:rPr b="0" lang="en-US" sz="2000" spc="-1" strike="noStrike">
                 <a:latin typeface="Arial"/>
               </a:rPr>
               <a:t>Sixth Outline Level</a:t>
             </a:r>
-            <a:endParaRPr b="0" lang="en-US" sz="2800" spc="-1" strike="noStrike">
-              <a:solidFill>
-                <a:srgbClr val="000000"/>
-              </a:solidFill>
+            <a:endParaRPr b="0" lang="en-US" sz="2000" spc="-1" strike="noStrike">
               <a:latin typeface="Arial"/>
             </a:endParaRPr>
           </a:p>
@@ -6050,18 +5643,12 @@
               <a:buChar char=""/>
             </a:pPr>
             <a:r>
-              <a:rPr b="0" lang="en-US" sz="2800" spc="-1" strike="noStrike">
-                <a:solidFill>
-                  <a:srgbClr val="000000"/>
-                </a:solidFill>
+              <a:rPr b="0" lang="en-US" sz="2000" spc="-1" strike="noStrike">
                 <a:latin typeface="Arial"/>
               </a:rPr>
               <a:t>Seventh Outline Level</a:t>
             </a:r>
-            <a:endParaRPr b="0" lang="en-US" sz="2800" spc="-1" strike="noStrike">
-              <a:solidFill>
-                <a:srgbClr val="000000"/>
-              </a:solidFill>
+            <a:endParaRPr b="0" lang="en-US" sz="2000" spc="-1" strike="noStrike">
               <a:latin typeface="Arial"/>
             </a:endParaRPr>
           </a:p>
@@ -6124,7 +5711,7 @@
         <p:spPr>
           <a:xfrm>
             <a:off x="6120" y="0"/>
-            <a:ext cx="10079280" cy="323280"/>
+            <a:ext cx="10078920" cy="322920"/>
           </a:xfrm>
           <a:prstGeom prst="rect">
             <a:avLst/>
@@ -6147,7 +5734,7 @@
         <p:spPr>
           <a:xfrm>
             <a:off x="6120" y="5357160"/>
-            <a:ext cx="10079280" cy="323280"/>
+            <a:ext cx="10078920" cy="322920"/>
           </a:xfrm>
           <a:prstGeom prst="rect">
             <a:avLst/>
@@ -6166,7 +5753,7 @@
         <p:spPr>
           <a:xfrm>
             <a:off x="1728360" y="5400360"/>
-            <a:ext cx="2347560" cy="390240"/>
+            <a:ext cx="2347200" cy="389880"/>
           </a:xfrm>
           <a:prstGeom prst="rect">
             <a:avLst/>
@@ -6215,7 +5802,7 @@
         <p:spPr>
           <a:xfrm>
             <a:off x="4221360" y="5400360"/>
-            <a:ext cx="3194280" cy="390240"/>
+            <a:ext cx="3193920" cy="389880"/>
           </a:xfrm>
           <a:prstGeom prst="rect">
             <a:avLst/>
@@ -6264,7 +5851,7 @@
         <p:spPr>
           <a:xfrm>
             <a:off x="7659720" y="5400360"/>
-            <a:ext cx="2347560" cy="390240"/>
+            <a:ext cx="2347200" cy="389880"/>
           </a:xfrm>
           <a:prstGeom prst="rect">
             <a:avLst/>
@@ -6288,7 +5875,7 @@
                 <a:spcPct val="100000"/>
               </a:lnSpc>
             </a:pPr>
-            <a:fld id="{0E5760B0-BBEE-41AF-AB2B-4A10C693C916}" type="slidenum">
+            <a:fld id="{6FD3EC75-4A44-42D7-B81B-BF533D912CBD}" type="slidenum">
               <a:rPr b="0" lang="en-US" sz="1400" spc="-1" strike="noStrike">
                 <a:solidFill>
                   <a:srgbClr val="ffffff"/>
@@ -6296,7 +5883,7 @@
                 <a:latin typeface="Times New Roman"/>
                 <a:ea typeface="Times New Roman"/>
               </a:rPr>
-              <a:t>&lt;number&gt;</a:t>
+              <a:t>1</a:t>
             </a:fld>
             <a:endParaRPr b="0" lang="en-US" sz="1400" spc="-1" strike="noStrike">
               <a:latin typeface="Arial"/>
@@ -6326,19 +5913,14 @@
         <p:txBody>
           <a:bodyPr lIns="0" rIns="0" tIns="0" bIns="0" anchor="ctr"/>
           <a:p>
-            <a:r>
-              <a:rPr b="0" lang="en-US" sz="1400" spc="-1" strike="noStrike">
-                <a:solidFill>
-                  <a:srgbClr val="000000"/>
-                </a:solidFill>
+            <a:pPr algn="ctr"/>
+            <a:r>
+              <a:rPr b="0" lang="en-US" sz="4400" spc="-1" strike="noStrike">
                 <a:latin typeface="Arial"/>
               </a:rPr>
               <a:t>Click to edit the title text format</a:t>
             </a:r>
-            <a:endParaRPr b="0" lang="en-US" sz="1400" spc="-1" strike="noStrike">
-              <a:solidFill>
-                <a:srgbClr val="000000"/>
-              </a:solidFill>
+            <a:endParaRPr b="0" lang="en-US" sz="4400" spc="-1" strike="noStrike">
               <a:latin typeface="Arial"/>
             </a:endParaRPr>
           </a:p>
@@ -6380,18 +5962,12 @@
               <a:buChar char=""/>
             </a:pPr>
             <a:r>
-              <a:rPr b="0" lang="en-US" sz="1400" spc="-1" strike="noStrike">
-                <a:solidFill>
-                  <a:srgbClr val="000000"/>
-                </a:solidFill>
+              <a:rPr b="0" lang="en-US" sz="3200" spc="-1" strike="noStrike">
                 <a:latin typeface="Arial"/>
               </a:rPr>
               <a:t>Click to edit the outline text format</a:t>
             </a:r>
-            <a:endParaRPr b="0" lang="en-US" sz="1400" spc="-1" strike="noStrike">
-              <a:solidFill>
-                <a:srgbClr val="000000"/>
-              </a:solidFill>
+            <a:endParaRPr b="0" lang="en-US" sz="3200" spc="-1" strike="noStrike">
               <a:latin typeface="Arial"/>
             </a:endParaRPr>
           </a:p>
@@ -6408,18 +5984,12 @@
               <a:buChar char=""/>
             </a:pPr>
             <a:r>
-              <a:rPr b="0" lang="en-US" sz="1400" spc="-1" strike="noStrike">
-                <a:solidFill>
-                  <a:srgbClr val="000000"/>
-                </a:solidFill>
+              <a:rPr b="0" lang="en-US" sz="2800" spc="-1" strike="noStrike">
                 <a:latin typeface="Arial"/>
               </a:rPr>
               <a:t>Second Outline Level</a:t>
             </a:r>
-            <a:endParaRPr b="0" lang="en-US" sz="1400" spc="-1" strike="noStrike">
-              <a:solidFill>
-                <a:srgbClr val="000000"/>
-              </a:solidFill>
+            <a:endParaRPr b="0" lang="en-US" sz="2800" spc="-1" strike="noStrike">
               <a:latin typeface="Arial"/>
             </a:endParaRPr>
           </a:p>
@@ -6436,18 +6006,12 @@
               <a:buChar char=""/>
             </a:pPr>
             <a:r>
-              <a:rPr b="0" lang="en-US" sz="1400" spc="-1" strike="noStrike">
-                <a:solidFill>
-                  <a:srgbClr val="000000"/>
-                </a:solidFill>
+              <a:rPr b="0" lang="en-US" sz="2400" spc="-1" strike="noStrike">
                 <a:latin typeface="Arial"/>
               </a:rPr>
               <a:t>Third Outline Level</a:t>
             </a:r>
-            <a:endParaRPr b="0" lang="en-US" sz="1400" spc="-1" strike="noStrike">
-              <a:solidFill>
-                <a:srgbClr val="000000"/>
-              </a:solidFill>
+            <a:endParaRPr b="0" lang="en-US" sz="2400" spc="-1" strike="noStrike">
               <a:latin typeface="Arial"/>
             </a:endParaRPr>
           </a:p>
@@ -6464,18 +6028,12 @@
               <a:buChar char=""/>
             </a:pPr>
             <a:r>
-              <a:rPr b="0" lang="en-US" sz="1400" spc="-1" strike="noStrike">
-                <a:solidFill>
-                  <a:srgbClr val="000000"/>
-                </a:solidFill>
+              <a:rPr b="0" lang="en-US" sz="2000" spc="-1" strike="noStrike">
                 <a:latin typeface="Arial"/>
               </a:rPr>
               <a:t>Fourth Outline Level</a:t>
             </a:r>
-            <a:endParaRPr b="0" lang="en-US" sz="1400" spc="-1" strike="noStrike">
-              <a:solidFill>
-                <a:srgbClr val="000000"/>
-              </a:solidFill>
+            <a:endParaRPr b="0" lang="en-US" sz="2000" spc="-1" strike="noStrike">
               <a:latin typeface="Arial"/>
             </a:endParaRPr>
           </a:p>
@@ -6493,17 +6051,11 @@
             </a:pPr>
             <a:r>
               <a:rPr b="0" lang="en-US" sz="2000" spc="-1" strike="noStrike">
-                <a:solidFill>
-                  <a:srgbClr val="000000"/>
-                </a:solidFill>
                 <a:latin typeface="Arial"/>
               </a:rPr>
               <a:t>Fifth Outline Level</a:t>
             </a:r>
             <a:endParaRPr b="0" lang="en-US" sz="2000" spc="-1" strike="noStrike">
-              <a:solidFill>
-                <a:srgbClr val="000000"/>
-              </a:solidFill>
               <a:latin typeface="Arial"/>
             </a:endParaRPr>
           </a:p>
@@ -6521,17 +6073,11 @@
             </a:pPr>
             <a:r>
               <a:rPr b="0" lang="en-US" sz="2000" spc="-1" strike="noStrike">
-                <a:solidFill>
-                  <a:srgbClr val="000000"/>
-                </a:solidFill>
                 <a:latin typeface="Arial"/>
               </a:rPr>
               <a:t>Sixth Outline Level</a:t>
             </a:r>
             <a:endParaRPr b="0" lang="en-US" sz="2000" spc="-1" strike="noStrike">
-              <a:solidFill>
-                <a:srgbClr val="000000"/>
-              </a:solidFill>
               <a:latin typeface="Arial"/>
             </a:endParaRPr>
           </a:p>
@@ -6549,17 +6095,11 @@
             </a:pPr>
             <a:r>
               <a:rPr b="0" lang="en-US" sz="2000" spc="-1" strike="noStrike">
-                <a:solidFill>
-                  <a:srgbClr val="000000"/>
-                </a:solidFill>
                 <a:latin typeface="Arial"/>
               </a:rPr>
               <a:t>Seventh Outline Level</a:t>
             </a:r>
             <a:endParaRPr b="0" lang="en-US" sz="2000" spc="-1" strike="noStrike">
-              <a:solidFill>
-                <a:srgbClr val="000000"/>
-              </a:solidFill>
               <a:latin typeface="Arial"/>
             </a:endParaRPr>
           </a:p>
@@ -6622,7 +6162,7 @@
         <p:spPr>
           <a:xfrm>
             <a:off x="6120" y="0"/>
-            <a:ext cx="10079280" cy="323280"/>
+            <a:ext cx="10078920" cy="322920"/>
           </a:xfrm>
           <a:prstGeom prst="rect">
             <a:avLst/>
@@ -6645,7 +6185,7 @@
         <p:spPr>
           <a:xfrm>
             <a:off x="6120" y="5357160"/>
-            <a:ext cx="10079280" cy="323280"/>
+            <a:ext cx="10078920" cy="322920"/>
           </a:xfrm>
           <a:prstGeom prst="rect">
             <a:avLst/>
@@ -6664,7 +6204,7 @@
         <p:spPr>
           <a:xfrm>
             <a:off x="1728360" y="5400360"/>
-            <a:ext cx="2347560" cy="390240"/>
+            <a:ext cx="2347200" cy="389880"/>
           </a:xfrm>
           <a:prstGeom prst="rect">
             <a:avLst/>
@@ -6713,7 +6253,7 @@
         <p:spPr>
           <a:xfrm>
             <a:off x="4221360" y="5400360"/>
-            <a:ext cx="3194280" cy="390240"/>
+            <a:ext cx="3193920" cy="389880"/>
           </a:xfrm>
           <a:prstGeom prst="rect">
             <a:avLst/>
@@ -6762,7 +6302,7 @@
         <p:spPr>
           <a:xfrm>
             <a:off x="7659720" y="5400360"/>
-            <a:ext cx="2347560" cy="390240"/>
+            <a:ext cx="2347200" cy="389880"/>
           </a:xfrm>
           <a:prstGeom prst="rect">
             <a:avLst/>
@@ -6786,7 +6326,7 @@
                 <a:spcPct val="100000"/>
               </a:lnSpc>
             </a:pPr>
-            <a:fld id="{189BB8DD-D230-4950-AF51-9968D626C941}" type="slidenum">
+            <a:fld id="{4B3AAC3B-AB8C-4AC7-A58F-958E2D0B72B3}" type="slidenum">
               <a:rPr b="0" lang="en-US" sz="1400" spc="-1" strike="noStrike">
                 <a:solidFill>
                   <a:srgbClr val="ffffff"/>
@@ -6794,7 +6334,7 @@
                 <a:latin typeface="Times New Roman"/>
                 <a:ea typeface="Times New Roman"/>
               </a:rPr>
-              <a:t>&lt;number&gt;</a:t>
+              <a:t>1</a:t>
             </a:fld>
             <a:endParaRPr b="0" lang="en-US" sz="1400" spc="-1" strike="noStrike">
               <a:latin typeface="Arial"/>
@@ -6814,8 +6354,8 @@
         </p:nvSpPr>
         <p:spPr>
           <a:xfrm>
-            <a:off x="504000" y="565560"/>
-            <a:ext cx="9070920" cy="945720"/>
+            <a:off x="504000" y="226080"/>
+            <a:ext cx="9071640" cy="946080"/>
           </a:xfrm>
           <a:prstGeom prst="rect">
             <a:avLst/>
@@ -6825,18 +6365,12 @@
           <a:bodyPr lIns="0" rIns="0" tIns="0" bIns="0" anchor="ctr"/>
           <a:p>
             <a:r>
-              <a:rPr b="0" lang="en-US" sz="4400" spc="-1" strike="noStrike">
-                <a:solidFill>
-                  <a:srgbClr val="000000"/>
-                </a:solidFill>
+              <a:rPr b="0" lang="en-US" sz="1800" spc="-1" strike="noStrike">
                 <a:latin typeface="Arial"/>
               </a:rPr>
               <a:t>Click to edit the title text format</a:t>
             </a:r>
-            <a:endParaRPr b="0" lang="en-US" sz="4400" spc="-1" strike="noStrike">
-              <a:solidFill>
-                <a:srgbClr val="000000"/>
-              </a:solidFill>
+            <a:endParaRPr b="0" lang="en-US" sz="1800" spc="-1" strike="noStrike">
               <a:latin typeface="Arial"/>
             </a:endParaRPr>
           </a:p>
@@ -6855,7 +6389,7 @@
         <p:spPr>
           <a:xfrm>
             <a:off x="504000" y="1326600"/>
-            <a:ext cx="9072000" cy="3288600"/>
+            <a:ext cx="9071640" cy="3288240"/>
           </a:xfrm>
           <a:prstGeom prst="rect">
             <a:avLst/>
@@ -6878,18 +6412,12 @@
               <a:buChar char=""/>
             </a:pPr>
             <a:r>
-              <a:rPr b="0" lang="en-US" sz="1400" spc="-1" strike="noStrike">
-                <a:solidFill>
-                  <a:srgbClr val="000000"/>
-                </a:solidFill>
+              <a:rPr b="0" lang="en-US" sz="1800" spc="-1" strike="noStrike">
                 <a:latin typeface="Arial"/>
               </a:rPr>
               <a:t>Click to edit the outline text format</a:t>
             </a:r>
-            <a:endParaRPr b="0" lang="en-US" sz="1400" spc="-1" strike="noStrike">
-              <a:solidFill>
-                <a:srgbClr val="000000"/>
-              </a:solidFill>
+            <a:endParaRPr b="0" lang="en-US" sz="1800" spc="-1" strike="noStrike">
               <a:latin typeface="Arial"/>
             </a:endParaRPr>
           </a:p>
@@ -6906,18 +6434,12 @@
               <a:buChar char=""/>
             </a:pPr>
             <a:r>
-              <a:rPr b="0" lang="en-US" sz="1400" spc="-1" strike="noStrike">
-                <a:solidFill>
-                  <a:srgbClr val="000000"/>
-                </a:solidFill>
+              <a:rPr b="0" lang="en-US" sz="1800" spc="-1" strike="noStrike">
                 <a:latin typeface="Arial"/>
               </a:rPr>
               <a:t>Second Outline Level</a:t>
             </a:r>
-            <a:endParaRPr b="0" lang="en-US" sz="1400" spc="-1" strike="noStrike">
-              <a:solidFill>
-                <a:srgbClr val="000000"/>
-              </a:solidFill>
+            <a:endParaRPr b="0" lang="en-US" sz="1800" spc="-1" strike="noStrike">
               <a:latin typeface="Arial"/>
             </a:endParaRPr>
           </a:p>
@@ -6934,18 +6456,12 @@
               <a:buChar char=""/>
             </a:pPr>
             <a:r>
-              <a:rPr b="0" lang="en-US" sz="1400" spc="-1" strike="noStrike">
-                <a:solidFill>
-                  <a:srgbClr val="000000"/>
-                </a:solidFill>
+              <a:rPr b="0" lang="en-US" sz="1800" spc="-1" strike="noStrike">
                 <a:latin typeface="Arial"/>
               </a:rPr>
               <a:t>Third Outline Level</a:t>
             </a:r>
-            <a:endParaRPr b="0" lang="en-US" sz="1400" spc="-1" strike="noStrike">
-              <a:solidFill>
-                <a:srgbClr val="000000"/>
-              </a:solidFill>
+            <a:endParaRPr b="0" lang="en-US" sz="1800" spc="-1" strike="noStrike">
               <a:latin typeface="Arial"/>
             </a:endParaRPr>
           </a:p>
@@ -6962,18 +6478,12 @@
               <a:buChar char=""/>
             </a:pPr>
             <a:r>
-              <a:rPr b="0" lang="en-US" sz="1400" spc="-1" strike="noStrike">
-                <a:solidFill>
-                  <a:srgbClr val="000000"/>
-                </a:solidFill>
+              <a:rPr b="0" lang="en-US" sz="1800" spc="-1" strike="noStrike">
                 <a:latin typeface="Arial"/>
               </a:rPr>
               <a:t>Fourth Outline Level</a:t>
             </a:r>
-            <a:endParaRPr b="0" lang="en-US" sz="1400" spc="-1" strike="noStrike">
-              <a:solidFill>
-                <a:srgbClr val="000000"/>
-              </a:solidFill>
+            <a:endParaRPr b="0" lang="en-US" sz="1800" spc="-1" strike="noStrike">
               <a:latin typeface="Arial"/>
             </a:endParaRPr>
           </a:p>
@@ -6990,18 +6500,12 @@
               <a:buChar char=""/>
             </a:pPr>
             <a:r>
-              <a:rPr b="0" lang="en-US" sz="2000" spc="-1" strike="noStrike">
-                <a:solidFill>
-                  <a:srgbClr val="000000"/>
-                </a:solidFill>
+              <a:rPr b="0" lang="en-US" sz="1800" spc="-1" strike="noStrike">
                 <a:latin typeface="Arial"/>
               </a:rPr>
               <a:t>Fifth Outline Level</a:t>
             </a:r>
-            <a:endParaRPr b="0" lang="en-US" sz="2000" spc="-1" strike="noStrike">
-              <a:solidFill>
-                <a:srgbClr val="000000"/>
-              </a:solidFill>
+            <a:endParaRPr b="0" lang="en-US" sz="1800" spc="-1" strike="noStrike">
               <a:latin typeface="Arial"/>
             </a:endParaRPr>
           </a:p>
@@ -7018,18 +6522,12 @@
               <a:buChar char=""/>
             </a:pPr>
             <a:r>
-              <a:rPr b="0" lang="en-US" sz="2000" spc="-1" strike="noStrike">
-                <a:solidFill>
-                  <a:srgbClr val="000000"/>
-                </a:solidFill>
+              <a:rPr b="0" lang="en-US" sz="1800" spc="-1" strike="noStrike">
                 <a:latin typeface="Arial"/>
               </a:rPr>
               <a:t>Sixth Outline Level</a:t>
             </a:r>
-            <a:endParaRPr b="0" lang="en-US" sz="2000" spc="-1" strike="noStrike">
-              <a:solidFill>
-                <a:srgbClr val="000000"/>
-              </a:solidFill>
+            <a:endParaRPr b="0" lang="en-US" sz="1800" spc="-1" strike="noStrike">
               <a:latin typeface="Arial"/>
             </a:endParaRPr>
           </a:p>
@@ -7046,18 +6544,12 @@
               <a:buChar char=""/>
             </a:pPr>
             <a:r>
-              <a:rPr b="0" lang="en-US" sz="2000" spc="-1" strike="noStrike">
-                <a:solidFill>
-                  <a:srgbClr val="000000"/>
-                </a:solidFill>
+              <a:rPr b="0" lang="en-US" sz="1800" spc="-1" strike="noStrike">
                 <a:latin typeface="Arial"/>
               </a:rPr>
               <a:t>Seventh Outline Level</a:t>
             </a:r>
-            <a:endParaRPr b="0" lang="en-US" sz="2000" spc="-1" strike="noStrike">
-              <a:solidFill>
-                <a:srgbClr val="000000"/>
-              </a:solidFill>
+            <a:endParaRPr b="0" lang="en-US" sz="1800" spc="-1" strike="noStrike">
               <a:latin typeface="Arial"/>
             </a:endParaRPr>
           </a:p>
@@ -7120,7 +6612,7 @@
         <p:spPr>
           <a:xfrm>
             <a:off x="6120" y="0"/>
-            <a:ext cx="10079280" cy="323280"/>
+            <a:ext cx="10078920" cy="322920"/>
           </a:xfrm>
           <a:prstGeom prst="rect">
             <a:avLst/>
@@ -7143,7 +6635,7 @@
         <p:spPr>
           <a:xfrm>
             <a:off x="6120" y="5357160"/>
-            <a:ext cx="10079280" cy="323280"/>
+            <a:ext cx="10078920" cy="322920"/>
           </a:xfrm>
           <a:prstGeom prst="rect">
             <a:avLst/>
@@ -7162,7 +6654,7 @@
         <p:spPr>
           <a:xfrm>
             <a:off x="1728360" y="5400360"/>
-            <a:ext cx="2347560" cy="390240"/>
+            <a:ext cx="2347200" cy="389880"/>
           </a:xfrm>
           <a:prstGeom prst="rect">
             <a:avLst/>
@@ -7211,7 +6703,7 @@
         <p:spPr>
           <a:xfrm>
             <a:off x="4221360" y="5400360"/>
-            <a:ext cx="3194280" cy="390240"/>
+            <a:ext cx="3193920" cy="389880"/>
           </a:xfrm>
           <a:prstGeom prst="rect">
             <a:avLst/>
@@ -7260,7 +6752,7 @@
         <p:spPr>
           <a:xfrm>
             <a:off x="7659720" y="5400360"/>
-            <a:ext cx="2347560" cy="390240"/>
+            <a:ext cx="2347200" cy="389880"/>
           </a:xfrm>
           <a:prstGeom prst="rect">
             <a:avLst/>
@@ -7284,7 +6776,7 @@
                 <a:spcPct val="100000"/>
               </a:lnSpc>
             </a:pPr>
-            <a:fld id="{B0F52EC9-E12E-422B-B9E0-A7AE327243E2}" type="slidenum">
+            <a:fld id="{520C520E-8164-4781-83DE-56D8602DEB36}" type="slidenum">
               <a:rPr b="0" lang="en-US" sz="1400" spc="-1" strike="noStrike">
                 <a:solidFill>
                   <a:srgbClr val="ffffff"/>
@@ -7292,7 +6784,7 @@
                 <a:latin typeface="Times New Roman"/>
                 <a:ea typeface="Times New Roman"/>
               </a:rPr>
-              <a:t>&lt;number&gt;</a:t>
+              <a:t>1</a:t>
             </a:fld>
             <a:endParaRPr b="0" lang="en-US" sz="1400" spc="-1" strike="noStrike">
               <a:latin typeface="Arial"/>
@@ -7322,19 +6814,14 @@
         <p:txBody>
           <a:bodyPr lIns="0" rIns="0" tIns="0" bIns="0" anchor="ctr"/>
           <a:p>
-            <a:r>
-              <a:rPr b="0" lang="en-US" sz="1400" spc="-1" strike="noStrike">
-                <a:solidFill>
-                  <a:srgbClr val="000000"/>
-                </a:solidFill>
+            <a:pPr algn="ctr"/>
+            <a:r>
+              <a:rPr b="0" lang="en-US" sz="4400" spc="-1" strike="noStrike">
                 <a:latin typeface="Arial"/>
               </a:rPr>
               <a:t>Click to edit the title text format</a:t>
             </a:r>
-            <a:endParaRPr b="0" lang="en-US" sz="1400" spc="-1" strike="noStrike">
-              <a:solidFill>
-                <a:srgbClr val="000000"/>
-              </a:solidFill>
+            <a:endParaRPr b="0" lang="en-US" sz="4400" spc="-1" strike="noStrike">
               <a:latin typeface="Arial"/>
             </a:endParaRPr>
           </a:p>
@@ -7376,18 +6863,12 @@
               <a:buChar char=""/>
             </a:pPr>
             <a:r>
-              <a:rPr b="0" lang="en-US" sz="1400" spc="-1" strike="noStrike">
-                <a:solidFill>
-                  <a:srgbClr val="000000"/>
-                </a:solidFill>
+              <a:rPr b="0" lang="en-US" sz="3200" spc="-1" strike="noStrike">
                 <a:latin typeface="Arial"/>
               </a:rPr>
               <a:t>Click to edit the outline text format</a:t>
             </a:r>
-            <a:endParaRPr b="0" lang="en-US" sz="1400" spc="-1" strike="noStrike">
-              <a:solidFill>
-                <a:srgbClr val="000000"/>
-              </a:solidFill>
+            <a:endParaRPr b="0" lang="en-US" sz="3200" spc="-1" strike="noStrike">
               <a:latin typeface="Arial"/>
             </a:endParaRPr>
           </a:p>
@@ -7404,18 +6885,12 @@
               <a:buChar char=""/>
             </a:pPr>
             <a:r>
-              <a:rPr b="0" lang="en-US" sz="1400" spc="-1" strike="noStrike">
-                <a:solidFill>
-                  <a:srgbClr val="000000"/>
-                </a:solidFill>
+              <a:rPr b="0" lang="en-US" sz="2800" spc="-1" strike="noStrike">
                 <a:latin typeface="Arial"/>
               </a:rPr>
               <a:t>Second Outline Level</a:t>
             </a:r>
-            <a:endParaRPr b="0" lang="en-US" sz="1400" spc="-1" strike="noStrike">
-              <a:solidFill>
-                <a:srgbClr val="000000"/>
-              </a:solidFill>
+            <a:endParaRPr b="0" lang="en-US" sz="2800" spc="-1" strike="noStrike">
               <a:latin typeface="Arial"/>
             </a:endParaRPr>
           </a:p>
@@ -7432,18 +6907,12 @@
               <a:buChar char=""/>
             </a:pPr>
             <a:r>
-              <a:rPr b="0" lang="en-US" sz="1400" spc="-1" strike="noStrike">
-                <a:solidFill>
-                  <a:srgbClr val="000000"/>
-                </a:solidFill>
+              <a:rPr b="0" lang="en-US" sz="2400" spc="-1" strike="noStrike">
                 <a:latin typeface="Arial"/>
               </a:rPr>
               <a:t>Third Outline Level</a:t>
             </a:r>
-            <a:endParaRPr b="0" lang="en-US" sz="1400" spc="-1" strike="noStrike">
-              <a:solidFill>
-                <a:srgbClr val="000000"/>
-              </a:solidFill>
+            <a:endParaRPr b="0" lang="en-US" sz="2400" spc="-1" strike="noStrike">
               <a:latin typeface="Arial"/>
             </a:endParaRPr>
           </a:p>
@@ -7460,18 +6929,12 @@
               <a:buChar char=""/>
             </a:pPr>
             <a:r>
-              <a:rPr b="0" lang="en-US" sz="1400" spc="-1" strike="noStrike">
-                <a:solidFill>
-                  <a:srgbClr val="000000"/>
-                </a:solidFill>
+              <a:rPr b="0" lang="en-US" sz="2000" spc="-1" strike="noStrike">
                 <a:latin typeface="Arial"/>
               </a:rPr>
               <a:t>Fourth Outline Level</a:t>
             </a:r>
-            <a:endParaRPr b="0" lang="en-US" sz="1400" spc="-1" strike="noStrike">
-              <a:solidFill>
-                <a:srgbClr val="000000"/>
-              </a:solidFill>
+            <a:endParaRPr b="0" lang="en-US" sz="2000" spc="-1" strike="noStrike">
               <a:latin typeface="Arial"/>
             </a:endParaRPr>
           </a:p>
@@ -7489,17 +6952,11 @@
             </a:pPr>
             <a:r>
               <a:rPr b="0" lang="en-US" sz="2000" spc="-1" strike="noStrike">
-                <a:solidFill>
-                  <a:srgbClr val="000000"/>
-                </a:solidFill>
                 <a:latin typeface="Arial"/>
               </a:rPr>
               <a:t>Fifth Outline Level</a:t>
             </a:r>
             <a:endParaRPr b="0" lang="en-US" sz="2000" spc="-1" strike="noStrike">
-              <a:solidFill>
-                <a:srgbClr val="000000"/>
-              </a:solidFill>
               <a:latin typeface="Arial"/>
             </a:endParaRPr>
           </a:p>
@@ -7517,17 +6974,11 @@
             </a:pPr>
             <a:r>
               <a:rPr b="0" lang="en-US" sz="2000" spc="-1" strike="noStrike">
-                <a:solidFill>
-                  <a:srgbClr val="000000"/>
-                </a:solidFill>
                 <a:latin typeface="Arial"/>
               </a:rPr>
               <a:t>Sixth Outline Level</a:t>
             </a:r>
             <a:endParaRPr b="0" lang="en-US" sz="2000" spc="-1" strike="noStrike">
-              <a:solidFill>
-                <a:srgbClr val="000000"/>
-              </a:solidFill>
               <a:latin typeface="Arial"/>
             </a:endParaRPr>
           </a:p>
@@ -7545,17 +6996,11 @@
             </a:pPr>
             <a:r>
               <a:rPr b="0" lang="en-US" sz="2000" spc="-1" strike="noStrike">
-                <a:solidFill>
-                  <a:srgbClr val="000000"/>
-                </a:solidFill>
                 <a:latin typeface="Arial"/>
               </a:rPr>
               <a:t>Seventh Outline Level</a:t>
             </a:r>
             <a:endParaRPr b="0" lang="en-US" sz="2000" spc="-1" strike="noStrike">
-              <a:solidFill>
-                <a:srgbClr val="000000"/>
-              </a:solidFill>
               <a:latin typeface="Arial"/>
             </a:endParaRPr>
           </a:p>
@@ -7607,7 +7052,7 @@
         <p:spPr>
           <a:xfrm>
             <a:off x="7920" y="648000"/>
-            <a:ext cx="9070920" cy="2735280"/>
+            <a:ext cx="9070560" cy="2734920"/>
           </a:xfrm>
           <a:prstGeom prst="rect">
             <a:avLst/>
@@ -7658,7 +7103,7 @@
         <p:spPr>
           <a:xfrm>
             <a:off x="3816000" y="3600000"/>
-            <a:ext cx="5254920" cy="1295280"/>
+            <a:ext cx="5254560" cy="1294920"/>
           </a:xfrm>
           <a:prstGeom prst="rect">
             <a:avLst/>
@@ -7691,36 +7136,6 @@
                 <a:ea typeface="Arial"/>
               </a:rPr>
               <a:t>Manuel Aguilar</a:t>
-            </a:r>
-            <a:endParaRPr b="0" lang="en-US" sz="3200" spc="-1" strike="noStrike">
-              <a:latin typeface="Arial"/>
-            </a:endParaRPr>
-          </a:p>
-          <a:p>
-            <a:pPr algn="ctr">
-              <a:lnSpc>
-                <a:spcPct val="100000"/>
-              </a:lnSpc>
-            </a:pPr>
-            <a:r>
-              <a:rPr b="0" lang="en-US" sz="3200" spc="-1" strike="noStrike">
-                <a:solidFill>
-                  <a:srgbClr val="000000"/>
-                </a:solidFill>
-                <a:latin typeface="Arial"/>
-                <a:ea typeface="Arial"/>
-              </a:rPr>
-              <a:t>       </a:t>
-            </a:r>
-            <a:r>
-              <a:rPr b="0" lang="en-US" sz="3200" spc="-1" strike="noStrike">
-                <a:solidFill>
-                  <a:srgbClr val="000000"/>
-                </a:solidFill>
-                <a:latin typeface="Arial"/>
-                <a:ea typeface="Arial"/>
-              </a:rPr>
-              <a:t>Alejandro Sanchez</a:t>
             </a:r>
             <a:endParaRPr b="0" lang="en-US" sz="3200" spc="-1" strike="noStrike">
               <a:latin typeface="Arial"/>
@@ -7786,7 +7201,7 @@
         <p:spPr>
           <a:xfrm>
             <a:off x="504000" y="565560"/>
-            <a:ext cx="9070920" cy="945720"/>
+            <a:ext cx="9070560" cy="945360"/>
           </a:xfrm>
           <a:prstGeom prst="rect">
             <a:avLst/>
@@ -7816,7 +7231,7 @@
         <p:spPr>
           <a:xfrm>
             <a:off x="914400" y="640080"/>
-            <a:ext cx="8229240" cy="4403880"/>
+            <a:ext cx="8228880" cy="4403520"/>
           </a:xfrm>
           <a:prstGeom prst="rect">
             <a:avLst/>
@@ -7884,7 +7299,7 @@
         <p:spPr>
           <a:xfrm>
             <a:off x="504000" y="565560"/>
-            <a:ext cx="9070920" cy="945720"/>
+            <a:ext cx="9070560" cy="945360"/>
           </a:xfrm>
           <a:prstGeom prst="rect">
             <a:avLst/>
@@ -7914,7 +7329,7 @@
         <p:spPr>
           <a:xfrm>
             <a:off x="0" y="91440"/>
-            <a:ext cx="10080360" cy="5563800"/>
+            <a:ext cx="10080000" cy="5563440"/>
           </a:xfrm>
           <a:prstGeom prst="rect">
             <a:avLst/>
@@ -7982,7 +7397,7 @@
         <p:spPr>
           <a:xfrm>
             <a:off x="504000" y="565560"/>
-            <a:ext cx="9070920" cy="945720"/>
+            <a:ext cx="9070560" cy="945360"/>
           </a:xfrm>
           <a:prstGeom prst="rect">
             <a:avLst/>
@@ -8012,7 +7427,7 @@
         <p:spPr>
           <a:xfrm>
             <a:off x="1332000" y="565560"/>
-            <a:ext cx="7263000" cy="4055400"/>
+            <a:ext cx="7262640" cy="4055040"/>
           </a:xfrm>
           <a:prstGeom prst="rect">
             <a:avLst/>
@@ -8080,7 +7495,7 @@
         <p:spPr>
           <a:xfrm>
             <a:off x="504000" y="565560"/>
-            <a:ext cx="9070920" cy="945720"/>
+            <a:ext cx="9070560" cy="945360"/>
           </a:xfrm>
           <a:prstGeom prst="rect">
             <a:avLst/>
@@ -8110,7 +7525,7 @@
         <p:spPr>
           <a:xfrm>
             <a:off x="504000" y="365760"/>
-            <a:ext cx="9070920" cy="1371240"/>
+            <a:ext cx="9070560" cy="1370880"/>
           </a:xfrm>
           <a:prstGeom prst="rect">
             <a:avLst/>
@@ -8133,7 +7548,7 @@
         <p:spPr>
           <a:xfrm>
             <a:off x="33840" y="1097280"/>
-            <a:ext cx="10080000" cy="4573080"/>
+            <a:ext cx="10079640" cy="4572720"/>
           </a:xfrm>
           <a:prstGeom prst="rect">
             <a:avLst/>
@@ -8201,7 +7616,7 @@
         <p:spPr>
           <a:xfrm>
             <a:off x="504000" y="565560"/>
-            <a:ext cx="9070920" cy="945720"/>
+            <a:ext cx="9070560" cy="945360"/>
           </a:xfrm>
           <a:prstGeom prst="rect">
             <a:avLst/>
@@ -8231,7 +7646,7 @@
         <p:spPr>
           <a:xfrm>
             <a:off x="182880" y="731520"/>
-            <a:ext cx="9897480" cy="4297320"/>
+            <a:ext cx="9897120" cy="4296960"/>
           </a:xfrm>
           <a:prstGeom prst="rect">
             <a:avLst/>
@@ -8303,7 +7718,7 @@
         <p:spPr>
           <a:xfrm>
             <a:off x="91440" y="274320"/>
-            <a:ext cx="4178520" cy="2651760"/>
+            <a:ext cx="4178160" cy="2651400"/>
           </a:xfrm>
           <a:prstGeom prst="rect">
             <a:avLst/>
@@ -8326,7 +7741,7 @@
         <p:spPr>
           <a:xfrm>
             <a:off x="5760720" y="333720"/>
-            <a:ext cx="4114800" cy="2611440"/>
+            <a:ext cx="4114440" cy="2611080"/>
           </a:xfrm>
           <a:prstGeom prst="rect">
             <a:avLst/>
@@ -8349,7 +7764,7 @@
         <p:spPr>
           <a:xfrm>
             <a:off x="2926080" y="2945160"/>
-            <a:ext cx="4361760" cy="2725560"/>
+            <a:ext cx="4361400" cy="2725200"/>
           </a:xfrm>
           <a:prstGeom prst="rect">
             <a:avLst/>
@@ -8417,7 +7832,7 @@
         <p:spPr>
           <a:xfrm>
             <a:off x="504000" y="565560"/>
-            <a:ext cx="9070920" cy="945720"/>
+            <a:ext cx="9070560" cy="945360"/>
           </a:xfrm>
           <a:prstGeom prst="rect">
             <a:avLst/>
@@ -8470,7 +7885,7 @@
         <p:spPr>
           <a:xfrm>
             <a:off x="113760" y="1280160"/>
-            <a:ext cx="9966600" cy="3771720"/>
+            <a:ext cx="9966240" cy="3771360"/>
           </a:xfrm>
           <a:prstGeom prst="rect">
             <a:avLst/>
@@ -8538,7 +7953,7 @@
         <p:spPr>
           <a:xfrm>
             <a:off x="504000" y="565560"/>
-            <a:ext cx="9070920" cy="945720"/>
+            <a:ext cx="9070560" cy="945360"/>
           </a:xfrm>
           <a:prstGeom prst="rect">
             <a:avLst/>
@@ -8587,7 +8002,7 @@
         <p:spPr>
           <a:xfrm>
             <a:off x="381600" y="1508760"/>
-            <a:ext cx="9391320" cy="3737520"/>
+            <a:ext cx="9390960" cy="3737160"/>
           </a:xfrm>
           <a:prstGeom prst="rect">
             <a:avLst/>
@@ -8604,7 +8019,7 @@
           <a:fontRef idx="minor"/>
         </p:style>
         <p:txBody>
-          <a:bodyPr tIns="91440" bIns="91440"/>
+          <a:bodyPr lIns="90000" rIns="90000" tIns="91440" bIns="91440"/>
           <a:p>
             <a:pPr>
               <a:lnSpc>
@@ -8829,7 +8244,7 @@
         <p:spPr>
           <a:xfrm>
             <a:off x="1188720" y="483120"/>
-            <a:ext cx="7498080" cy="4592520"/>
+            <a:ext cx="7497720" cy="4592160"/>
           </a:xfrm>
           <a:prstGeom prst="rect">
             <a:avLst/>
@@ -8901,7 +8316,7 @@
         <p:spPr>
           <a:xfrm>
             <a:off x="1135800" y="162000"/>
-            <a:ext cx="7857720" cy="5390640"/>
+            <a:ext cx="7857360" cy="5390280"/>
           </a:xfrm>
           <a:prstGeom prst="rect">
             <a:avLst/>
@@ -8969,7 +8384,7 @@
         <p:spPr>
           <a:xfrm>
             <a:off x="563760" y="515880"/>
-            <a:ext cx="9070920" cy="945720"/>
+            <a:ext cx="9070560" cy="945360"/>
           </a:xfrm>
           <a:prstGeom prst="rect">
             <a:avLst/>
@@ -9018,7 +8433,7 @@
         <p:spPr>
           <a:xfrm>
             <a:off x="298080" y="1284840"/>
-            <a:ext cx="9034200" cy="2862000"/>
+            <a:ext cx="9033840" cy="2861640"/>
           </a:xfrm>
           <a:prstGeom prst="rect">
             <a:avLst/>
@@ -9035,7 +8450,7 @@
           <a:fontRef idx="minor"/>
         </p:style>
         <p:txBody>
-          <a:bodyPr/>
+          <a:bodyPr lIns="90000" rIns="90000" tIns="45000" bIns="45000"/>
           <a:p>
             <a:pPr>
               <a:lnSpc>
@@ -9191,7 +8606,7 @@
         <p:spPr>
           <a:xfrm>
             <a:off x="1031040" y="195120"/>
-            <a:ext cx="8067240" cy="5324040"/>
+            <a:ext cx="8066880" cy="5323680"/>
           </a:xfrm>
           <a:prstGeom prst="rect">
             <a:avLst/>
@@ -9263,7 +8678,7 @@
         <p:spPr>
           <a:xfrm>
             <a:off x="1135800" y="252360"/>
-            <a:ext cx="7857720" cy="5209920"/>
+            <a:ext cx="7857360" cy="5209560"/>
           </a:xfrm>
           <a:prstGeom prst="rect">
             <a:avLst/>
@@ -9335,7 +8750,7 @@
         <p:spPr>
           <a:xfrm>
             <a:off x="4114800" y="3017520"/>
-            <a:ext cx="5800320" cy="2571480"/>
+            <a:ext cx="5799960" cy="2571120"/>
           </a:xfrm>
           <a:prstGeom prst="rect">
             <a:avLst/>
@@ -9358,7 +8773,7 @@
         <p:spPr>
           <a:xfrm>
             <a:off x="2419920" y="91440"/>
-            <a:ext cx="7547040" cy="2481480"/>
+            <a:ext cx="7546680" cy="2481120"/>
           </a:xfrm>
           <a:prstGeom prst="rect">
             <a:avLst/>
@@ -9381,7 +8796,7 @@
         <p:spPr>
           <a:xfrm>
             <a:off x="-6840" y="91440"/>
-            <a:ext cx="2426760" cy="2426760"/>
+            <a:ext cx="2426400" cy="2426400"/>
           </a:xfrm>
           <a:prstGeom prst="rect">
             <a:avLst/>
@@ -9453,7 +8868,7 @@
         <p:spPr>
           <a:xfrm>
             <a:off x="91440" y="17640"/>
-            <a:ext cx="9875520" cy="5560200"/>
+            <a:ext cx="9875160" cy="5559840"/>
           </a:xfrm>
           <a:prstGeom prst="rect">
             <a:avLst/>
@@ -9476,7 +8891,7 @@
         <p:spPr>
           <a:xfrm>
             <a:off x="0" y="17640"/>
-            <a:ext cx="9966960" cy="896760"/>
+            <a:ext cx="9966600" cy="896400"/>
           </a:xfrm>
           <a:prstGeom prst="rect">
             <a:avLst/>
@@ -9544,7 +8959,7 @@
         <p:spPr>
           <a:xfrm>
             <a:off x="504000" y="565560"/>
-            <a:ext cx="9070920" cy="945720"/>
+            <a:ext cx="9070560" cy="945360"/>
           </a:xfrm>
           <a:prstGeom prst="rect">
             <a:avLst/>
@@ -9597,7 +9012,7 @@
         <p:spPr>
           <a:xfrm>
             <a:off x="0" y="1424520"/>
-            <a:ext cx="10080360" cy="3894840"/>
+            <a:ext cx="10080000" cy="3894480"/>
           </a:xfrm>
           <a:prstGeom prst="rect">
             <a:avLst/>
@@ -9665,7 +9080,7 @@
         <p:spPr>
           <a:xfrm>
             <a:off x="504000" y="565560"/>
-            <a:ext cx="9070920" cy="945720"/>
+            <a:ext cx="9070560" cy="945360"/>
           </a:xfrm>
           <a:prstGeom prst="rect">
             <a:avLst/>
@@ -9718,7 +9133,7 @@
         <p:spPr>
           <a:xfrm>
             <a:off x="7200" y="1511640"/>
-            <a:ext cx="10073160" cy="4127760"/>
+            <a:ext cx="10072800" cy="4127400"/>
           </a:xfrm>
           <a:prstGeom prst="rect">
             <a:avLst/>
@@ -9790,7 +9205,7 @@
         <p:spPr>
           <a:xfrm>
             <a:off x="12600" y="360"/>
-            <a:ext cx="7485480" cy="5670360"/>
+            <a:ext cx="7485120" cy="5670000"/>
           </a:xfrm>
           <a:prstGeom prst="rect">
             <a:avLst/>
@@ -9858,7 +9273,7 @@
         <p:spPr>
           <a:xfrm>
             <a:off x="504000" y="565560"/>
-            <a:ext cx="9070920" cy="945720"/>
+            <a:ext cx="9070560" cy="945360"/>
           </a:xfrm>
           <a:prstGeom prst="rect">
             <a:avLst/>
@@ -9911,7 +9326,7 @@
         <p:spPr>
           <a:xfrm>
             <a:off x="6035040" y="1272600"/>
-            <a:ext cx="4015080" cy="4347000"/>
+            <a:ext cx="4014720" cy="4346640"/>
           </a:xfrm>
           <a:prstGeom prst="rect">
             <a:avLst/>
@@ -9933,8 +9348,8 @@
         </p:blipFill>
         <p:spPr>
           <a:xfrm rot="5425800">
-            <a:off x="-418680" y="2048040"/>
-            <a:ext cx="4188960" cy="3141360"/>
+            <a:off x="-417960" y="2048040"/>
+            <a:ext cx="4188600" cy="3141000"/>
           </a:xfrm>
           <a:prstGeom prst="rect">
             <a:avLst/>
@@ -10002,7 +9417,7 @@
         <p:spPr>
           <a:xfrm>
             <a:off x="504000" y="565560"/>
-            <a:ext cx="9070920" cy="945720"/>
+            <a:ext cx="9070560" cy="945360"/>
           </a:xfrm>
           <a:prstGeom prst="rect">
             <a:avLst/>
@@ -10031,8 +9446,8 @@
         </p:blipFill>
         <p:spPr>
           <a:xfrm rot="5434200">
-            <a:off x="-38880" y="-602640"/>
-            <a:ext cx="10228320" cy="7670520"/>
+            <a:off x="-38520" y="-602640"/>
+            <a:ext cx="10227960" cy="7670160"/>
           </a:xfrm>
           <a:prstGeom prst="rect">
             <a:avLst/>
@@ -10100,7 +9515,7 @@
         <p:spPr>
           <a:xfrm>
             <a:off x="504000" y="565560"/>
-            <a:ext cx="9070920" cy="945720"/>
+            <a:ext cx="9070560" cy="945360"/>
           </a:xfrm>
           <a:prstGeom prst="rect">
             <a:avLst/>
@@ -10149,7 +9564,7 @@
         <p:spPr>
           <a:xfrm>
             <a:off x="139320" y="1511640"/>
-            <a:ext cx="9769680" cy="2031120"/>
+            <a:ext cx="9769320" cy="2030760"/>
           </a:xfrm>
           <a:prstGeom prst="rect">
             <a:avLst/>
@@ -10166,7 +9581,7 @@
           <a:fontRef idx="minor"/>
         </p:style>
         <p:txBody>
-          <a:bodyPr/>
+          <a:bodyPr lIns="90000" rIns="90000" tIns="45000" bIns="45000"/>
           <a:p>
             <a:pPr>
               <a:lnSpc>
@@ -10340,60 +9755,14 @@
       </p:grpSpPr>
       <p:sp>
         <p:nvSpPr>
-          <p:cNvPr id="175" name="TextShape 1"/>
-          <p:cNvSpPr txBox="1"/>
+          <p:cNvPr id="175" name="CustomShape 1"/>
+          <p:cNvSpPr/>
           <p:nvPr/>
         </p:nvSpPr>
         <p:spPr>
           <a:xfrm>
             <a:off x="504000" y="565560"/>
-            <a:ext cx="9070920" cy="945720"/>
-          </a:xfrm>
-          <a:prstGeom prst="rect">
-            <a:avLst/>
-          </a:prstGeom>
-          <a:noFill/>
-          <a:ln>
-            <a:noFill/>
-          </a:ln>
-        </p:spPr>
-        <p:txBody>
-          <a:bodyPr lIns="0" rIns="0" tIns="0" bIns="0" anchor="ctr"/>
-          <a:p>
-            <a:pPr>
-              <a:lnSpc>
-                <a:spcPct val="90000"/>
-              </a:lnSpc>
-            </a:pPr>
-            <a:r>
-              <a:rPr b="0" lang="en-US" sz="4400" spc="-1" strike="noStrike">
-                <a:solidFill>
-                  <a:srgbClr val="000000"/>
-                </a:solidFill>
-                <a:latin typeface="Arial"/>
-                <a:ea typeface="Arial"/>
-              </a:rPr>
-              <a:t>Second basic Cryptography</a:t>
-            </a:r>
-            <a:endParaRPr b="0" lang="en-US" sz="4400" spc="-1" strike="noStrike">
-              <a:solidFill>
-                <a:srgbClr val="000000"/>
-              </a:solidFill>
-              <a:latin typeface="Arial"/>
-            </a:endParaRPr>
-          </a:p>
-        </p:txBody>
-      </p:sp>
-      <p:sp>
-        <p:nvSpPr>
-          <p:cNvPr id="176" name="CustomShape 2"/>
-          <p:cNvSpPr/>
-          <p:nvPr/>
-        </p:nvSpPr>
-        <p:spPr>
-          <a:xfrm>
-            <a:off x="89280" y="1421280"/>
-            <a:ext cx="9749880" cy="2307960"/>
+            <a:ext cx="9070560" cy="945360"/>
           </a:xfrm>
           <a:prstGeom prst="rect">
             <a:avLst/>
@@ -10410,7 +9779,56 @@
           <a:fontRef idx="minor"/>
         </p:style>
         <p:txBody>
-          <a:bodyPr/>
+          <a:bodyPr lIns="0" rIns="0" tIns="0" bIns="0" anchor="ctr"/>
+          <a:p>
+            <a:pPr>
+              <a:lnSpc>
+                <a:spcPct val="90000"/>
+              </a:lnSpc>
+            </a:pPr>
+            <a:r>
+              <a:rPr b="0" lang="en-US" sz="4400" spc="-1" strike="noStrike">
+                <a:solidFill>
+                  <a:srgbClr val="000000"/>
+                </a:solidFill>
+                <a:latin typeface="Arial"/>
+                <a:ea typeface="Arial"/>
+              </a:rPr>
+              <a:t>Second basic Cryptography</a:t>
+            </a:r>
+            <a:endParaRPr b="0" lang="en-US" sz="4400" spc="-1" strike="noStrike">
+              <a:latin typeface="Arial"/>
+            </a:endParaRPr>
+          </a:p>
+        </p:txBody>
+      </p:sp>
+      <p:sp>
+        <p:nvSpPr>
+          <p:cNvPr id="176" name="CustomShape 2"/>
+          <p:cNvSpPr/>
+          <p:nvPr/>
+        </p:nvSpPr>
+        <p:spPr>
+          <a:xfrm>
+            <a:off x="89280" y="1421280"/>
+            <a:ext cx="9749520" cy="2307600"/>
+          </a:xfrm>
+          <a:prstGeom prst="rect">
+            <a:avLst/>
+          </a:prstGeom>
+          <a:noFill/>
+          <a:ln>
+            <a:noFill/>
+          </a:ln>
+        </p:spPr>
+        <p:style>
+          <a:lnRef idx="0"/>
+          <a:fillRef idx="0"/>
+          <a:effectRef idx="0"/>
+          <a:fontRef idx="minor"/>
+        </p:style>
+        <p:txBody>
+          <a:bodyPr lIns="90000" rIns="90000" tIns="45000" bIns="45000"/>
           <a:p>
             <a:pPr>
               <a:lnSpc>
@@ -10581,7 +9999,7 @@
         <p:spPr>
           <a:xfrm>
             <a:off x="496800" y="675720"/>
-            <a:ext cx="9203400" cy="2307960"/>
+            <a:ext cx="9203040" cy="2307600"/>
           </a:xfrm>
           <a:prstGeom prst="rect">
             <a:avLst/>
@@ -10598,7 +10016,7 @@
           <a:fontRef idx="minor"/>
         </p:style>
         <p:txBody>
-          <a:bodyPr/>
+          <a:bodyPr lIns="90000" rIns="90000" tIns="45000" bIns="45000"/>
           <a:p>
             <a:pPr>
               <a:lnSpc>
@@ -10732,60 +10150,14 @@
       </p:grpSpPr>
       <p:sp>
         <p:nvSpPr>
-          <p:cNvPr id="178" name="TextShape 1"/>
-          <p:cNvSpPr txBox="1"/>
+          <p:cNvPr id="178" name="CustomShape 1"/>
+          <p:cNvSpPr/>
           <p:nvPr/>
         </p:nvSpPr>
         <p:spPr>
           <a:xfrm>
             <a:off x="504000" y="565560"/>
-            <a:ext cx="9070920" cy="945720"/>
-          </a:xfrm>
-          <a:prstGeom prst="rect">
-            <a:avLst/>
-          </a:prstGeom>
-          <a:noFill/>
-          <a:ln>
-            <a:noFill/>
-          </a:ln>
-        </p:spPr>
-        <p:txBody>
-          <a:bodyPr lIns="0" rIns="0" tIns="0" bIns="0" anchor="ctr"/>
-          <a:p>
-            <a:pPr>
-              <a:lnSpc>
-                <a:spcPct val="90000"/>
-              </a:lnSpc>
-            </a:pPr>
-            <a:r>
-              <a:rPr b="0" lang="en-US" sz="4400" spc="-1" strike="noStrike">
-                <a:solidFill>
-                  <a:srgbClr val="000000"/>
-                </a:solidFill>
-                <a:latin typeface="Arial"/>
-                <a:ea typeface="Arial"/>
-              </a:rPr>
-              <a:t>Encrypted Text</a:t>
-            </a:r>
-            <a:endParaRPr b="0" lang="en-US" sz="4400" spc="-1" strike="noStrike">
-              <a:solidFill>
-                <a:srgbClr val="000000"/>
-              </a:solidFill>
-              <a:latin typeface="Arial"/>
-            </a:endParaRPr>
-          </a:p>
-        </p:txBody>
-      </p:sp>
-      <p:sp>
-        <p:nvSpPr>
-          <p:cNvPr id="179" name="CustomShape 2"/>
-          <p:cNvSpPr/>
-          <p:nvPr/>
-        </p:nvSpPr>
-        <p:spPr>
-          <a:xfrm>
-            <a:off x="477000" y="1649880"/>
-            <a:ext cx="9097920" cy="107290440"/>
+            <a:ext cx="9070560" cy="945360"/>
           </a:xfrm>
           <a:prstGeom prst="rect">
             <a:avLst/>
@@ -10802,7 +10174,56 @@
           <a:fontRef idx="minor"/>
         </p:style>
         <p:txBody>
-          <a:bodyPr/>
+          <a:bodyPr lIns="0" rIns="0" tIns="0" bIns="0" anchor="ctr"/>
+          <a:p>
+            <a:pPr>
+              <a:lnSpc>
+                <a:spcPct val="90000"/>
+              </a:lnSpc>
+            </a:pPr>
+            <a:r>
+              <a:rPr b="0" lang="en-US" sz="4400" spc="-1" strike="noStrike">
+                <a:solidFill>
+                  <a:srgbClr val="000000"/>
+                </a:solidFill>
+                <a:latin typeface="Arial"/>
+                <a:ea typeface="Arial"/>
+              </a:rPr>
+              <a:t>Encrypted Text</a:t>
+            </a:r>
+            <a:endParaRPr b="0" lang="en-US" sz="4400" spc="-1" strike="noStrike">
+              <a:latin typeface="Arial"/>
+            </a:endParaRPr>
+          </a:p>
+        </p:txBody>
+      </p:sp>
+      <p:sp>
+        <p:nvSpPr>
+          <p:cNvPr id="179" name="CustomShape 2"/>
+          <p:cNvSpPr/>
+          <p:nvPr/>
+        </p:nvSpPr>
+        <p:spPr>
+          <a:xfrm>
+            <a:off x="477000" y="1649880"/>
+            <a:ext cx="9097560" cy="107290080"/>
+          </a:xfrm>
+          <a:prstGeom prst="rect">
+            <a:avLst/>
+          </a:prstGeom>
+          <a:noFill/>
+          <a:ln>
+            <a:noFill/>
+          </a:ln>
+        </p:spPr>
+        <p:style>
+          <a:lnRef idx="0"/>
+          <a:fillRef idx="0"/>
+          <a:effectRef idx="0"/>
+          <a:fontRef idx="minor"/>
+        </p:style>
+        <p:txBody>
+          <a:bodyPr lIns="90000" rIns="90000" tIns="45000" bIns="45000"/>
           <a:p>
             <a:pPr>
               <a:lnSpc>
@@ -21373,7 +20794,7 @@
         <p:spPr>
           <a:xfrm>
             <a:off x="327960" y="606240"/>
-            <a:ext cx="9402120" cy="20035800"/>
+            <a:ext cx="9401760" cy="20035440"/>
           </a:xfrm>
           <a:prstGeom prst="rect">
             <a:avLst/>
@@ -21390,7 +20811,7 @@
           <a:fontRef idx="minor"/>
         </p:style>
         <p:txBody>
-          <a:bodyPr/>
+          <a:bodyPr lIns="90000" rIns="90000" tIns="45000" bIns="45000"/>
           <a:p>
             <a:pPr>
               <a:lnSpc>
@@ -22944,14 +22365,14 @@
       </p:grpSpPr>
       <p:sp>
         <p:nvSpPr>
-          <p:cNvPr id="181" name="TextShape 1"/>
-          <p:cNvSpPr txBox="1"/>
+          <p:cNvPr id="181" name="CustomShape 1"/>
+          <p:cNvSpPr/>
           <p:nvPr/>
         </p:nvSpPr>
         <p:spPr>
           <a:xfrm>
             <a:off x="504000" y="565560"/>
-            <a:ext cx="9070920" cy="4386240"/>
+            <a:ext cx="9070560" cy="4385880"/>
           </a:xfrm>
           <a:prstGeom prst="rect">
             <a:avLst/>
@@ -22961,6 +22382,12 @@
             <a:noFill/>
           </a:ln>
         </p:spPr>
+        <p:style>
+          <a:lnRef idx="0"/>
+          <a:fillRef idx="0"/>
+          <a:effectRef idx="0"/>
+          <a:fontRef idx="minor"/>
+        </p:style>
         <p:txBody>
           <a:bodyPr lIns="0" rIns="0" tIns="0" bIns="0" anchor="ctr"/>
           <a:p>
@@ -23353,7 +22780,7 @@
         <p:spPr>
           <a:xfrm>
             <a:off x="504000" y="565560"/>
-            <a:ext cx="9070920" cy="945720"/>
+            <a:ext cx="9070560" cy="945360"/>
           </a:xfrm>
           <a:prstGeom prst="rect">
             <a:avLst/>
@@ -23406,7 +22833,7 @@
         <p:spPr>
           <a:xfrm>
             <a:off x="1645920" y="1424880"/>
-            <a:ext cx="6340680" cy="1592640"/>
+            <a:ext cx="6340320" cy="1592280"/>
           </a:xfrm>
           <a:prstGeom prst="rect">
             <a:avLst/>
@@ -23429,7 +22856,7 @@
         <p:spPr>
           <a:xfrm>
             <a:off x="731520" y="3429360"/>
-            <a:ext cx="8529480" cy="1782720"/>
+            <a:ext cx="8529120" cy="1782360"/>
           </a:xfrm>
           <a:prstGeom prst="rect">
             <a:avLst/>

</xml_diff>